<commit_message>
Updated slides with a few updates.
</commit_message>
<xml_diff>
--- a/dockerizerd-applications.pptx
+++ b/dockerizerd-applications.pptx
@@ -2,10 +2,10 @@
 <file path=ppt/presentation.xml><?xml version="1.0" encoding="utf-8"?>
 <p:presentation xmlns:a="http://schemas.openxmlformats.org/drawingml/2006/main" xmlns:r="http://schemas.openxmlformats.org/officeDocument/2006/relationships" xmlns:p="http://schemas.openxmlformats.org/presentationml/2006/main" saveSubsetFonts="1" autoCompressPictures="0">
   <p:sldMasterIdLst>
-    <p:sldMasterId id="2147484075" r:id="rId1"/>
+    <p:sldMasterId id="2147484279" r:id="rId1"/>
   </p:sldMasterIdLst>
   <p:notesMasterIdLst>
-    <p:notesMasterId r:id="rId16"/>
+    <p:notesMasterId r:id="rId17"/>
   </p:notesMasterIdLst>
   <p:sldIdLst>
     <p:sldId id="256" r:id="rId2"/>
@@ -20,8 +20,9 @@
     <p:sldId id="265" r:id="rId11"/>
     <p:sldId id="267" r:id="rId12"/>
     <p:sldId id="266" r:id="rId13"/>
-    <p:sldId id="269" r:id="rId14"/>
-    <p:sldId id="270" r:id="rId15"/>
+    <p:sldId id="272" r:id="rId14"/>
+    <p:sldId id="269" r:id="rId15"/>
+    <p:sldId id="270" r:id="rId16"/>
   </p:sldIdLst>
   <p:sldSz cx="12192000" cy="6858000"/>
   <p:notesSz cx="6858000" cy="9144000"/>
@@ -210,7 +211,7 @@
           <a:p>
             <a:fld id="{A43F8C84-758B-48CE-814F-120A29CC94CC}" type="datetimeFigureOut">
               <a:rPr lang="en-US" smtClean="0"/>
-              <a:t>4/27/17</a:t>
+              <a:t>4/28/17</a:t>
             </a:fld>
             <a:endParaRPr lang="en-US"/>
           </a:p>
@@ -562,7 +563,7 @@
 </file>
 
 <file path=ppt/slideLayouts/slideLayout1.xml><?xml version="1.0" encoding="utf-8"?>
-<p:sldLayout xmlns:a="http://schemas.openxmlformats.org/drawingml/2006/main" xmlns:r="http://schemas.openxmlformats.org/officeDocument/2006/relationships" xmlns:p="http://schemas.openxmlformats.org/presentationml/2006/main" type="title" preserve="1">
+<p:sldLayout xmlns:a="http://schemas.openxmlformats.org/drawingml/2006/main" xmlns:r="http://schemas.openxmlformats.org/officeDocument/2006/relationships" xmlns:p="http://schemas.openxmlformats.org/presentationml/2006/main" showMasterSp="0" type="title" preserve="1">
   <p:cSld name="Title Slide">
     <p:spTree>
       <p:nvGrpSpPr>
@@ -580,25 +581,113 @@
       </p:grpSpPr>
       <p:sp>
         <p:nvSpPr>
-          <p:cNvPr id="2" name="Title 1"/>
-          <p:cNvSpPr>
-            <a:spLocks noGrp="1"/>
-          </p:cNvSpPr>
-          <p:nvPr>
-            <p:ph type="ctrTitle"/>
-          </p:nvPr>
+          <p:cNvPr id="7" name="Rectangle 6"/>
+          <p:cNvSpPr/>
+          <p:nvPr/>
         </p:nvSpPr>
         <p:spPr>
           <a:xfrm>
-            <a:off x="1524000" y="1122363"/>
-            <a:ext cx="9144000" cy="2387600"/>
+            <a:off x="3175" y="6400800"/>
+            <a:ext cx="12188825" cy="457200"/>
+          </a:xfrm>
+          <a:prstGeom prst="rect">
+            <a:avLst/>
+          </a:prstGeom>
+          <a:solidFill>
+            <a:schemeClr val="accent2"/>
+          </a:solidFill>
+          <a:ln>
+            <a:noFill/>
+          </a:ln>
+        </p:spPr>
+        <p:style>
+          <a:lnRef idx="2">
+            <a:schemeClr val="accent1">
+              <a:shade val="50000"/>
+            </a:schemeClr>
+          </a:lnRef>
+          <a:fillRef idx="1">
+            <a:schemeClr val="accent1"/>
+          </a:fillRef>
+          <a:effectRef idx="0">
+            <a:schemeClr val="accent1"/>
+          </a:effectRef>
+          <a:fontRef idx="minor">
+            <a:schemeClr val="lt1"/>
+          </a:fontRef>
+        </p:style>
+      </p:sp>
+      <p:sp>
+        <p:nvSpPr>
+          <p:cNvPr id="8" name="Rectangle 7"/>
+          <p:cNvSpPr/>
+          <p:nvPr/>
+        </p:nvSpPr>
+        <p:spPr>
+          <a:xfrm>
+            <a:off x="15" y="6334316"/>
+            <a:ext cx="12188825" cy="64008"/>
+          </a:xfrm>
+          <a:prstGeom prst="rect">
+            <a:avLst/>
+          </a:prstGeom>
+          <a:solidFill>
+            <a:schemeClr val="accent1"/>
+          </a:solidFill>
+          <a:ln>
+            <a:noFill/>
+          </a:ln>
+        </p:spPr>
+        <p:style>
+          <a:lnRef idx="2">
+            <a:schemeClr val="accent1">
+              <a:shade val="50000"/>
+            </a:schemeClr>
+          </a:lnRef>
+          <a:fillRef idx="1">
+            <a:schemeClr val="accent1"/>
+          </a:fillRef>
+          <a:effectRef idx="0">
+            <a:schemeClr val="accent1"/>
+          </a:effectRef>
+          <a:fontRef idx="minor">
+            <a:schemeClr val="lt1"/>
+          </a:fontRef>
+        </p:style>
+      </p:sp>
+      <p:sp>
+        <p:nvSpPr>
+          <p:cNvPr id="2" name="Title 1"/>
+          <p:cNvSpPr>
+            <a:spLocks noGrp="1"/>
+          </p:cNvSpPr>
+          <p:nvPr>
+            <p:ph type="ctrTitle"/>
+          </p:nvPr>
+        </p:nvSpPr>
+        <p:spPr>
+          <a:xfrm>
+            <a:off x="1097280" y="758952"/>
+            <a:ext cx="10058400" cy="3566160"/>
           </a:xfrm>
         </p:spPr>
         <p:txBody>
-          <a:bodyPr anchor="b"/>
+          <a:bodyPr anchor="b">
+            <a:normAutofit/>
+          </a:bodyPr>
           <a:lstStyle>
-            <a:lvl1pPr algn="ctr">
-              <a:defRPr sz="6000"/>
+            <a:lvl1pPr algn="l">
+              <a:lnSpc>
+                <a:spcPct val="85000"/>
+              </a:lnSpc>
+              <a:defRPr sz="8000" spc="-50" baseline="0">
+                <a:solidFill>
+                  <a:schemeClr val="tx1">
+                    <a:lumMod val="85000"/>
+                    <a:lumOff val="15000"/>
+                  </a:schemeClr>
+                </a:solidFill>
+              </a:defRPr>
             </a:lvl1pPr>
           </a:lstStyle>
           <a:p>
@@ -606,7 +695,7 @@
               <a:rPr lang="en-US" smtClean="0"/>
               <a:t>Click to edit Master title style</a:t>
             </a:r>
-            <a:endParaRPr lang="en-US"/>
+            <a:endParaRPr lang="en-US" dirty="0"/>
           </a:p>
         </p:txBody>
       </p:sp>
@@ -622,48 +711,55 @@
         </p:nvSpPr>
         <p:spPr>
           <a:xfrm>
-            <a:off x="1524000" y="3602038"/>
-            <a:ext cx="9144000" cy="1655762"/>
+            <a:off x="1100051" y="4455620"/>
+            <a:ext cx="10058400" cy="1143000"/>
           </a:xfrm>
         </p:spPr>
         <p:txBody>
-          <a:bodyPr/>
+          <a:bodyPr lIns="91440" rIns="91440">
+            <a:normAutofit/>
+          </a:bodyPr>
           <a:lstStyle>
-            <a:lvl1pPr marL="0" indent="0" algn="ctr">
+            <a:lvl1pPr marL="0" indent="0" algn="l">
               <a:buNone/>
-              <a:defRPr sz="2400"/>
+              <a:defRPr sz="2400" cap="all" spc="200" baseline="0">
+                <a:solidFill>
+                  <a:schemeClr val="tx2"/>
+                </a:solidFill>
+                <a:latin typeface="+mj-lt"/>
+              </a:defRPr>
             </a:lvl1pPr>
             <a:lvl2pPr marL="457200" indent="0" algn="ctr">
               <a:buNone/>
-              <a:defRPr sz="2000"/>
+              <a:defRPr sz="2400"/>
             </a:lvl2pPr>
             <a:lvl3pPr marL="914400" indent="0" algn="ctr">
               <a:buNone/>
-              <a:defRPr sz="1800"/>
+              <a:defRPr sz="2400"/>
             </a:lvl3pPr>
             <a:lvl4pPr marL="1371600" indent="0" algn="ctr">
               <a:buNone/>
-              <a:defRPr sz="1600"/>
+              <a:defRPr sz="2000"/>
             </a:lvl4pPr>
             <a:lvl5pPr marL="1828800" indent="0" algn="ctr">
               <a:buNone/>
-              <a:defRPr sz="1600"/>
+              <a:defRPr sz="2000"/>
             </a:lvl5pPr>
             <a:lvl6pPr marL="2286000" indent="0" algn="ctr">
               <a:buNone/>
-              <a:defRPr sz="1600"/>
+              <a:defRPr sz="2000"/>
             </a:lvl6pPr>
             <a:lvl7pPr marL="2743200" indent="0" algn="ctr">
               <a:buNone/>
-              <a:defRPr sz="1600"/>
+              <a:defRPr sz="2000"/>
             </a:lvl7pPr>
             <a:lvl8pPr marL="3200400" indent="0" algn="ctr">
               <a:buNone/>
-              <a:defRPr sz="1600"/>
+              <a:defRPr sz="2000"/>
             </a:lvl8pPr>
             <a:lvl9pPr marL="3657600" indent="0" algn="ctr">
               <a:buNone/>
-              <a:defRPr sz="1600"/>
+              <a:defRPr sz="2000"/>
             </a:lvl9pPr>
           </a:lstStyle>
           <a:p>
@@ -671,7 +767,7 @@
               <a:rPr lang="en-US" smtClean="0"/>
               <a:t>Click to edit Master subtitle style</a:t>
             </a:r>
-            <a:endParaRPr lang="en-US"/>
+            <a:endParaRPr lang="en-US" dirty="0"/>
           </a:p>
         </p:txBody>
       </p:sp>
@@ -692,7 +788,7 @@
           <a:p>
             <a:fld id="{48A87A34-81AB-432B-8DAE-1953F412C126}" type="datetimeFigureOut">
               <a:rPr lang="en-US" smtClean="0"/>
-              <a:t>4/27/17</a:t>
+              <a:t>4/28/17</a:t>
             </a:fld>
             <a:endParaRPr lang="en-US" dirty="0"/>
           </a:p>
@@ -740,6 +836,44 @@
           </a:p>
         </p:txBody>
       </p:sp>
+      <p:cxnSp>
+        <p:nvCxnSpPr>
+          <p:cNvPr id="9" name="Straight Connector 8"/>
+          <p:cNvCxnSpPr/>
+          <p:nvPr/>
+        </p:nvCxnSpPr>
+        <p:spPr>
+          <a:xfrm>
+            <a:off x="1207658" y="4343400"/>
+            <a:ext cx="9875520" cy="0"/>
+          </a:xfrm>
+          <a:prstGeom prst="line">
+            <a:avLst/>
+          </a:prstGeom>
+          <a:ln w="6350">
+            <a:solidFill>
+              <a:schemeClr val="tx1">
+                <a:lumMod val="50000"/>
+                <a:lumOff val="50000"/>
+              </a:schemeClr>
+            </a:solidFill>
+          </a:ln>
+        </p:spPr>
+        <p:style>
+          <a:lnRef idx="1">
+            <a:schemeClr val="accent1"/>
+          </a:lnRef>
+          <a:fillRef idx="0">
+            <a:schemeClr val="accent1"/>
+          </a:fillRef>
+          <a:effectRef idx="0">
+            <a:schemeClr val="accent1"/>
+          </a:effectRef>
+          <a:fontRef idx="minor">
+            <a:schemeClr val="tx1"/>
+          </a:fontRef>
+        </p:style>
+      </p:cxnSp>
     </p:spTree>
   </p:cSld>
   <p:clrMapOvr>
@@ -789,7 +923,7 @@
               <a:rPr lang="en-US" smtClean="0"/>
               <a:t>Click to edit Master title style</a:t>
             </a:r>
-            <a:endParaRPr lang="en-US"/>
+            <a:endParaRPr lang="en-US" dirty="0"/>
           </a:p>
         </p:txBody>
       </p:sp>
@@ -805,7 +939,7 @@
         </p:nvSpPr>
         <p:spPr/>
         <p:txBody>
-          <a:bodyPr vert="eaVert"/>
+          <a:bodyPr vert="eaVert" lIns="45720" tIns="0" rIns="45720" bIns="0"/>
           <a:lstStyle/>
           <a:p>
             <a:pPr lvl="0"/>
@@ -841,7 +975,7 @@
               <a:rPr lang="en-US" smtClean="0"/>
               <a:t>Fifth level</a:t>
             </a:r>
-            <a:endParaRPr lang="en-US"/>
+            <a:endParaRPr lang="en-US" dirty="0"/>
           </a:p>
         </p:txBody>
       </p:sp>
@@ -862,7 +996,7 @@
           <a:p>
             <a:fld id="{48A87A34-81AB-432B-8DAE-1953F412C126}" type="datetimeFigureOut">
               <a:rPr lang="en-US" smtClean="0"/>
-              <a:t>4/27/17</a:t>
+              <a:t>4/28/17</a:t>
             </a:fld>
             <a:endParaRPr lang="en-US" dirty="0"/>
           </a:p>
@@ -919,7 +1053,7 @@
 </file>
 
 <file path=ppt/slideLayouts/slideLayout11.xml><?xml version="1.0" encoding="utf-8"?>
-<p:sldLayout xmlns:a="http://schemas.openxmlformats.org/drawingml/2006/main" xmlns:r="http://schemas.openxmlformats.org/officeDocument/2006/relationships" xmlns:p="http://schemas.openxmlformats.org/presentationml/2006/main" type="vertTitleAndTx" preserve="1">
+<p:sldLayout xmlns:a="http://schemas.openxmlformats.org/drawingml/2006/main" xmlns:r="http://schemas.openxmlformats.org/officeDocument/2006/relationships" xmlns:p="http://schemas.openxmlformats.org/presentationml/2006/main" showMasterSp="0" type="vertTitleAndTx" preserve="1">
   <p:cSld name="Vertical Title and Text">
     <p:spTree>
       <p:nvGrpSpPr>
@@ -937,18 +1071,94 @@
       </p:grpSpPr>
       <p:sp>
         <p:nvSpPr>
-          <p:cNvPr id="2" name="Vertical Title 1"/>
-          <p:cNvSpPr>
-            <a:spLocks noGrp="1"/>
-          </p:cNvSpPr>
-          <p:nvPr>
-            <p:ph type="title" orient="vert"/>
-          </p:nvPr>
+          <p:cNvPr id="7" name="Rectangle 6"/>
+          <p:cNvSpPr/>
+          <p:nvPr/>
         </p:nvSpPr>
         <p:spPr>
           <a:xfrm>
-            <a:off x="8724900" y="365125"/>
-            <a:ext cx="2628900" cy="5811838"/>
+            <a:off x="3175" y="6400800"/>
+            <a:ext cx="12188825" cy="457200"/>
+          </a:xfrm>
+          <a:prstGeom prst="rect">
+            <a:avLst/>
+          </a:prstGeom>
+          <a:solidFill>
+            <a:schemeClr val="accent2"/>
+          </a:solidFill>
+          <a:ln>
+            <a:noFill/>
+          </a:ln>
+        </p:spPr>
+        <p:style>
+          <a:lnRef idx="2">
+            <a:schemeClr val="accent1">
+              <a:shade val="50000"/>
+            </a:schemeClr>
+          </a:lnRef>
+          <a:fillRef idx="1">
+            <a:schemeClr val="accent1"/>
+          </a:fillRef>
+          <a:effectRef idx="0">
+            <a:schemeClr val="accent1"/>
+          </a:effectRef>
+          <a:fontRef idx="minor">
+            <a:schemeClr val="lt1"/>
+          </a:fontRef>
+        </p:style>
+      </p:sp>
+      <p:sp>
+        <p:nvSpPr>
+          <p:cNvPr id="8" name="Rectangle 7"/>
+          <p:cNvSpPr/>
+          <p:nvPr/>
+        </p:nvSpPr>
+        <p:spPr>
+          <a:xfrm>
+            <a:off x="15" y="6334316"/>
+            <a:ext cx="12188825" cy="64008"/>
+          </a:xfrm>
+          <a:prstGeom prst="rect">
+            <a:avLst/>
+          </a:prstGeom>
+          <a:solidFill>
+            <a:schemeClr val="accent1"/>
+          </a:solidFill>
+          <a:ln>
+            <a:noFill/>
+          </a:ln>
+        </p:spPr>
+        <p:style>
+          <a:lnRef idx="2">
+            <a:schemeClr val="accent1">
+              <a:shade val="50000"/>
+            </a:schemeClr>
+          </a:lnRef>
+          <a:fillRef idx="1">
+            <a:schemeClr val="accent1"/>
+          </a:fillRef>
+          <a:effectRef idx="0">
+            <a:schemeClr val="accent1"/>
+          </a:effectRef>
+          <a:fontRef idx="minor">
+            <a:schemeClr val="lt1"/>
+          </a:fontRef>
+        </p:style>
+      </p:sp>
+      <p:sp>
+        <p:nvSpPr>
+          <p:cNvPr id="2" name="Vertical Title 1"/>
+          <p:cNvSpPr>
+            <a:spLocks noGrp="1"/>
+          </p:cNvSpPr>
+          <p:nvPr>
+            <p:ph type="title" orient="vert"/>
+          </p:nvPr>
+        </p:nvSpPr>
+        <p:spPr>
+          <a:xfrm>
+            <a:off x="8724900" y="414778"/>
+            <a:ext cx="2628900" cy="5757421"/>
           </a:xfrm>
         </p:spPr>
         <p:txBody>
@@ -959,7 +1169,7 @@
               <a:rPr lang="en-US" smtClean="0"/>
               <a:t>Click to edit Master title style</a:t>
             </a:r>
-            <a:endParaRPr lang="en-US"/>
+            <a:endParaRPr lang="en-US" dirty="0"/>
           </a:p>
         </p:txBody>
       </p:sp>
@@ -975,12 +1185,12 @@
         </p:nvSpPr>
         <p:spPr>
           <a:xfrm>
-            <a:off x="838200" y="365125"/>
-            <a:ext cx="7734300" cy="5811838"/>
+            <a:off x="838200" y="414778"/>
+            <a:ext cx="7734300" cy="5757422"/>
           </a:xfrm>
         </p:spPr>
         <p:txBody>
-          <a:bodyPr vert="eaVert"/>
+          <a:bodyPr vert="eaVert" lIns="45720" tIns="0" rIns="45720" bIns="0"/>
           <a:lstStyle/>
           <a:p>
             <a:pPr lvl="0"/>
@@ -1016,7 +1226,7 @@
               <a:rPr lang="en-US" smtClean="0"/>
               <a:t>Fifth level</a:t>
             </a:r>
-            <a:endParaRPr lang="en-US"/>
+            <a:endParaRPr lang="en-US" dirty="0"/>
           </a:p>
         </p:txBody>
       </p:sp>
@@ -1037,7 +1247,7 @@
           <a:p>
             <a:fld id="{48A87A34-81AB-432B-8DAE-1953F412C126}" type="datetimeFigureOut">
               <a:rPr lang="en-US" smtClean="0"/>
-              <a:t>4/27/17</a:t>
+              <a:t>4/28/17</a:t>
             </a:fld>
             <a:endParaRPr lang="en-US" dirty="0"/>
           </a:p>
@@ -1128,13 +1338,17 @@
         <p:spPr/>
         <p:txBody>
           <a:bodyPr/>
-          <a:lstStyle/>
+          <a:lstStyle>
+            <a:lvl1pPr marL="0">
+              <a:defRPr/>
+            </a:lvl1pPr>
+          </a:lstStyle>
           <a:p>
             <a:r>
               <a:rPr lang="en-US" smtClean="0"/>
               <a:t>Click to edit Master title style</a:t>
             </a:r>
-            <a:endParaRPr lang="en-US"/>
+            <a:endParaRPr lang="en-US" dirty="0"/>
           </a:p>
         </p:txBody>
       </p:sp>
@@ -1186,7 +1400,7 @@
               <a:rPr lang="en-US" smtClean="0"/>
               <a:t>Fifth level</a:t>
             </a:r>
-            <a:endParaRPr lang="en-US"/>
+            <a:endParaRPr lang="en-US" dirty="0"/>
           </a:p>
         </p:txBody>
       </p:sp>
@@ -1207,7 +1421,7 @@
           <a:p>
             <a:fld id="{48A87A34-81AB-432B-8DAE-1953F412C126}" type="datetimeFigureOut">
               <a:rPr lang="en-US" smtClean="0"/>
-              <a:t>4/27/17</a:t>
+              <a:t>4/28/17</a:t>
             </a:fld>
             <a:endParaRPr lang="en-US" dirty="0"/>
           </a:p>
@@ -1264,8 +1478,16 @@
 </file>
 
 <file path=ppt/slideLayouts/slideLayout3.xml><?xml version="1.0" encoding="utf-8"?>
-<p:sldLayout xmlns:a="http://schemas.openxmlformats.org/drawingml/2006/main" xmlns:r="http://schemas.openxmlformats.org/officeDocument/2006/relationships" xmlns:p="http://schemas.openxmlformats.org/presentationml/2006/main" type="secHead" preserve="1">
+<p:sldLayout xmlns:a="http://schemas.openxmlformats.org/drawingml/2006/main" xmlns:r="http://schemas.openxmlformats.org/officeDocument/2006/relationships" xmlns:p="http://schemas.openxmlformats.org/presentationml/2006/main" showMasterSp="0" type="secHead" preserve="1">
   <p:cSld name="Section Header">
+    <p:bg>
+      <p:bgPr>
+        <a:solidFill>
+          <a:schemeClr val="bg1"/>
+        </a:solidFill>
+        <a:effectLst/>
+      </p:bgPr>
+    </p:bg>
     <p:spTree>
       <p:nvGrpSpPr>
         <p:cNvPr id="1" name=""/>
@@ -1282,68 +1504,157 @@
       </p:grpSpPr>
       <p:sp>
         <p:nvSpPr>
-          <p:cNvPr id="2" name="Title 1"/>
-          <p:cNvSpPr>
-            <a:spLocks noGrp="1"/>
-          </p:cNvSpPr>
-          <p:nvPr>
-            <p:ph type="title"/>
-          </p:nvPr>
+          <p:cNvPr id="7" name="Rectangle 6"/>
+          <p:cNvSpPr/>
+          <p:nvPr/>
         </p:nvSpPr>
         <p:spPr>
           <a:xfrm>
-            <a:off x="831850" y="1709738"/>
-            <a:ext cx="10515600" cy="2852737"/>
+            <a:off x="3175" y="6400800"/>
+            <a:ext cx="12188825" cy="457200"/>
+          </a:xfrm>
+          <a:prstGeom prst="rect">
+            <a:avLst/>
+          </a:prstGeom>
+          <a:solidFill>
+            <a:schemeClr val="accent2"/>
+          </a:solidFill>
+          <a:ln>
+            <a:noFill/>
+          </a:ln>
+        </p:spPr>
+        <p:style>
+          <a:lnRef idx="2">
+            <a:schemeClr val="accent1">
+              <a:shade val="50000"/>
+            </a:schemeClr>
+          </a:lnRef>
+          <a:fillRef idx="1">
+            <a:schemeClr val="accent1"/>
+          </a:fillRef>
+          <a:effectRef idx="0">
+            <a:schemeClr val="accent1"/>
+          </a:effectRef>
+          <a:fontRef idx="minor">
+            <a:schemeClr val="lt1"/>
+          </a:fontRef>
+        </p:style>
+      </p:sp>
+      <p:sp>
+        <p:nvSpPr>
+          <p:cNvPr id="8" name="Rectangle 7"/>
+          <p:cNvSpPr/>
+          <p:nvPr/>
+        </p:nvSpPr>
+        <p:spPr>
+          <a:xfrm>
+            <a:off x="15" y="6334316"/>
+            <a:ext cx="12188825" cy="64008"/>
+          </a:xfrm>
+          <a:prstGeom prst="rect">
+            <a:avLst/>
+          </a:prstGeom>
+          <a:solidFill>
+            <a:schemeClr val="accent1"/>
+          </a:solidFill>
+          <a:ln>
+            <a:noFill/>
+          </a:ln>
+        </p:spPr>
+        <p:style>
+          <a:lnRef idx="2">
+            <a:schemeClr val="accent1">
+              <a:shade val="50000"/>
+            </a:schemeClr>
+          </a:lnRef>
+          <a:fillRef idx="1">
+            <a:schemeClr val="accent1"/>
+          </a:fillRef>
+          <a:effectRef idx="0">
+            <a:schemeClr val="accent1"/>
+          </a:effectRef>
+          <a:fontRef idx="minor">
+            <a:schemeClr val="lt1"/>
+          </a:fontRef>
+        </p:style>
+      </p:sp>
+      <p:sp>
+        <p:nvSpPr>
+          <p:cNvPr id="2" name="Title 1"/>
+          <p:cNvSpPr>
+            <a:spLocks noGrp="1"/>
+          </p:cNvSpPr>
+          <p:nvPr>
+            <p:ph type="title"/>
+          </p:nvPr>
+        </p:nvSpPr>
+        <p:spPr>
+          <a:xfrm>
+            <a:off x="1097280" y="758952"/>
+            <a:ext cx="10058400" cy="3566160"/>
           </a:xfrm>
         </p:spPr>
         <p:txBody>
-          <a:bodyPr anchor="b"/>
+          <a:bodyPr anchor="b" anchorCtr="0">
+            <a:normAutofit/>
+          </a:bodyPr>
           <a:lstStyle>
             <a:lvl1pPr>
-              <a:defRPr sz="6000"/>
-            </a:lvl1pPr>
-          </a:lstStyle>
-          <a:p>
-            <a:r>
-              <a:rPr lang="en-US" smtClean="0"/>
-              <a:t>Click to edit Master title style</a:t>
-            </a:r>
-            <a:endParaRPr lang="en-US"/>
-          </a:p>
-        </p:txBody>
-      </p:sp>
-      <p:sp>
-        <p:nvSpPr>
-          <p:cNvPr id="3" name="Text Placeholder 2"/>
-          <p:cNvSpPr>
-            <a:spLocks noGrp="1"/>
-          </p:cNvSpPr>
-          <p:nvPr>
-            <p:ph type="body" idx="1"/>
-          </p:nvPr>
-        </p:nvSpPr>
-        <p:spPr>
-          <a:xfrm>
-            <a:off x="831850" y="4589463"/>
-            <a:ext cx="10515600" cy="1500187"/>
-          </a:xfrm>
-        </p:spPr>
-        <p:txBody>
-          <a:bodyPr/>
-          <a:lstStyle>
-            <a:lvl1pPr marL="0" indent="0">
-              <a:buNone/>
-              <a:defRPr sz="2400">
+              <a:lnSpc>
+                <a:spcPct val="85000"/>
+              </a:lnSpc>
+              <a:defRPr sz="8000" b="0">
                 <a:solidFill>
                   <a:schemeClr val="tx1">
-                    <a:tint val="75000"/>
+                    <a:lumMod val="85000"/>
+                    <a:lumOff val="15000"/>
                   </a:schemeClr>
                 </a:solidFill>
               </a:defRPr>
             </a:lvl1pPr>
+          </a:lstStyle>
+          <a:p>
+            <a:r>
+              <a:rPr lang="en-US" smtClean="0"/>
+              <a:t>Click to edit Master title style</a:t>
+            </a:r>
+            <a:endParaRPr lang="en-US" dirty="0"/>
+          </a:p>
+        </p:txBody>
+      </p:sp>
+      <p:sp>
+        <p:nvSpPr>
+          <p:cNvPr id="3" name="Text Placeholder 2"/>
+          <p:cNvSpPr>
+            <a:spLocks noGrp="1"/>
+          </p:cNvSpPr>
+          <p:nvPr>
+            <p:ph type="body" idx="1"/>
+          </p:nvPr>
+        </p:nvSpPr>
+        <p:spPr>
+          <a:xfrm>
+            <a:off x="1097280" y="4453128"/>
+            <a:ext cx="10058400" cy="1143000"/>
+          </a:xfrm>
+        </p:spPr>
+        <p:txBody>
+          <a:bodyPr lIns="91440" rIns="91440" anchor="t" anchorCtr="0">
+            <a:normAutofit/>
+          </a:bodyPr>
+          <a:lstStyle>
+            <a:lvl1pPr marL="0" indent="0">
+              <a:buNone/>
+              <a:defRPr sz="2400" cap="all" spc="200" baseline="0">
+                <a:solidFill>
+                  <a:schemeClr val="tx2"/>
+                </a:solidFill>
+                <a:latin typeface="+mj-lt"/>
+              </a:defRPr>
+            </a:lvl1pPr>
             <a:lvl2pPr marL="457200" indent="0">
               <a:buNone/>
-              <a:defRPr sz="2000">
+              <a:defRPr sz="1800">
                 <a:solidFill>
                   <a:schemeClr val="tx1">
                     <a:tint val="75000"/>
@@ -1353,7 +1664,7 @@
             </a:lvl2pPr>
             <a:lvl3pPr marL="914400" indent="0">
               <a:buNone/>
-              <a:defRPr sz="1800">
+              <a:defRPr sz="1600">
                 <a:solidFill>
                   <a:schemeClr val="tx1">
                     <a:tint val="75000"/>
@@ -1363,7 +1674,7 @@
             </a:lvl3pPr>
             <a:lvl4pPr marL="1371600" indent="0">
               <a:buNone/>
-              <a:defRPr sz="1600">
+              <a:defRPr sz="1400">
                 <a:solidFill>
                   <a:schemeClr val="tx1">
                     <a:tint val="75000"/>
@@ -1373,7 +1684,7 @@
             </a:lvl4pPr>
             <a:lvl5pPr marL="1828800" indent="0">
               <a:buNone/>
-              <a:defRPr sz="1600">
+              <a:defRPr sz="1400">
                 <a:solidFill>
                   <a:schemeClr val="tx1">
                     <a:tint val="75000"/>
@@ -1383,7 +1694,7 @@
             </a:lvl5pPr>
             <a:lvl6pPr marL="2286000" indent="0">
               <a:buNone/>
-              <a:defRPr sz="1600">
+              <a:defRPr sz="1400">
                 <a:solidFill>
                   <a:schemeClr val="tx1">
                     <a:tint val="75000"/>
@@ -1393,7 +1704,7 @@
             </a:lvl6pPr>
             <a:lvl7pPr marL="2743200" indent="0">
               <a:buNone/>
-              <a:defRPr sz="1600">
+              <a:defRPr sz="1400">
                 <a:solidFill>
                   <a:schemeClr val="tx1">
                     <a:tint val="75000"/>
@@ -1403,7 +1714,7 @@
             </a:lvl7pPr>
             <a:lvl8pPr marL="3200400" indent="0">
               <a:buNone/>
-              <a:defRPr sz="1600">
+              <a:defRPr sz="1400">
                 <a:solidFill>
                   <a:schemeClr val="tx1">
                     <a:tint val="75000"/>
@@ -1413,7 +1724,7 @@
             </a:lvl8pPr>
             <a:lvl9pPr marL="3657600" indent="0">
               <a:buNone/>
-              <a:defRPr sz="1600">
+              <a:defRPr sz="1400">
                 <a:solidFill>
                   <a:schemeClr val="tx1">
                     <a:tint val="75000"/>
@@ -1448,7 +1759,7 @@
           <a:p>
             <a:fld id="{48A87A34-81AB-432B-8DAE-1953F412C126}" type="datetimeFigureOut">
               <a:rPr lang="en-US" smtClean="0"/>
-              <a:t>4/27/17</a:t>
+              <a:t>4/28/17</a:t>
             </a:fld>
             <a:endParaRPr lang="en-US" dirty="0"/>
           </a:p>
@@ -1496,6 +1807,44 @@
           </a:p>
         </p:txBody>
       </p:sp>
+      <p:cxnSp>
+        <p:nvCxnSpPr>
+          <p:cNvPr id="9" name="Straight Connector 8"/>
+          <p:cNvCxnSpPr/>
+          <p:nvPr/>
+        </p:nvCxnSpPr>
+        <p:spPr>
+          <a:xfrm>
+            <a:off x="1207658" y="4343400"/>
+            <a:ext cx="9875520" cy="0"/>
+          </a:xfrm>
+          <a:prstGeom prst="line">
+            <a:avLst/>
+          </a:prstGeom>
+          <a:ln w="6350">
+            <a:solidFill>
+              <a:schemeClr val="tx1">
+                <a:lumMod val="50000"/>
+                <a:lumOff val="50000"/>
+              </a:schemeClr>
+            </a:solidFill>
+          </a:ln>
+        </p:spPr>
+        <p:style>
+          <a:lnRef idx="1">
+            <a:schemeClr val="accent1"/>
+          </a:lnRef>
+          <a:fillRef idx="0">
+            <a:schemeClr val="accent1"/>
+          </a:fillRef>
+          <a:effectRef idx="0">
+            <a:schemeClr val="accent1"/>
+          </a:effectRef>
+          <a:fontRef idx="minor">
+            <a:schemeClr val="tx1"/>
+          </a:fontRef>
+        </p:style>
+      </p:cxnSp>
     </p:spTree>
   </p:cSld>
   <p:clrMapOvr>
@@ -1528,98 +1877,46 @@
       </p:grpSpPr>
       <p:sp>
         <p:nvSpPr>
-          <p:cNvPr id="2" name="Title 1"/>
+          <p:cNvPr id="8" name="Title 7"/>
           <p:cNvSpPr>
             <a:spLocks noGrp="1"/>
           </p:cNvSpPr>
           <p:nvPr>
             <p:ph type="title"/>
-          </p:nvPr>
-        </p:nvSpPr>
-        <p:spPr/>
-        <p:txBody>
-          <a:bodyPr/>
-          <a:lstStyle/>
-          <a:p>
-            <a:r>
-              <a:rPr lang="en-US" smtClean="0"/>
-              <a:t>Click to edit Master title style</a:t>
-            </a:r>
-            <a:endParaRPr lang="en-US"/>
-          </a:p>
-        </p:txBody>
-      </p:sp>
-      <p:sp>
-        <p:nvSpPr>
-          <p:cNvPr id="3" name="Content Placeholder 2"/>
-          <p:cNvSpPr>
-            <a:spLocks noGrp="1"/>
-          </p:cNvSpPr>
-          <p:nvPr>
-            <p:ph sz="half" idx="1"/>
           </p:nvPr>
         </p:nvSpPr>
         <p:spPr>
           <a:xfrm>
-            <a:off x="838200" y="1825625"/>
-            <a:ext cx="5181600" cy="4351338"/>
+            <a:off x="1097280" y="286603"/>
+            <a:ext cx="10058400" cy="1450757"/>
           </a:xfrm>
         </p:spPr>
         <p:txBody>
           <a:bodyPr/>
           <a:lstStyle/>
           <a:p>
-            <a:pPr lvl="0"/>
-            <a:r>
-              <a:rPr lang="en-US" smtClean="0"/>
-              <a:t>Click to edit Master text styles</a:t>
-            </a:r>
-          </a:p>
-          <a:p>
-            <a:pPr lvl="1"/>
-            <a:r>
-              <a:rPr lang="en-US" smtClean="0"/>
-              <a:t>Second level</a:t>
-            </a:r>
-          </a:p>
-          <a:p>
-            <a:pPr lvl="2"/>
-            <a:r>
-              <a:rPr lang="en-US" smtClean="0"/>
-              <a:t>Third level</a:t>
-            </a:r>
-          </a:p>
-          <a:p>
-            <a:pPr lvl="3"/>
-            <a:r>
-              <a:rPr lang="en-US" smtClean="0"/>
-              <a:t>Fourth level</a:t>
-            </a:r>
-          </a:p>
-          <a:p>
-            <a:pPr lvl="4"/>
-            <a:r>
-              <a:rPr lang="en-US" smtClean="0"/>
-              <a:t>Fifth level</a:t>
-            </a:r>
-            <a:endParaRPr lang="en-US"/>
-          </a:p>
-        </p:txBody>
-      </p:sp>
-      <p:sp>
-        <p:nvSpPr>
-          <p:cNvPr id="4" name="Content Placeholder 3"/>
-          <p:cNvSpPr>
-            <a:spLocks noGrp="1"/>
-          </p:cNvSpPr>
-          <p:nvPr>
-            <p:ph sz="half" idx="2"/>
+            <a:r>
+              <a:rPr lang="en-US" smtClean="0"/>
+              <a:t>Click to edit Master title style</a:t>
+            </a:r>
+            <a:endParaRPr lang="en-US" dirty="0"/>
+          </a:p>
+        </p:txBody>
+      </p:sp>
+      <p:sp>
+        <p:nvSpPr>
+          <p:cNvPr id="3" name="Content Placeholder 2"/>
+          <p:cNvSpPr>
+            <a:spLocks noGrp="1"/>
+          </p:cNvSpPr>
+          <p:nvPr>
+            <p:ph sz="half" idx="1"/>
           </p:nvPr>
         </p:nvSpPr>
         <p:spPr>
           <a:xfrm>
-            <a:off x="6172200" y="1825625"/>
-            <a:ext cx="5181600" cy="4351338"/>
+            <a:off x="1097279" y="1845734"/>
+            <a:ext cx="4937760" cy="4023360"/>
           </a:xfrm>
         </p:spPr>
         <p:txBody>
@@ -1659,7 +1956,64 @@
               <a:rPr lang="en-US" smtClean="0"/>
               <a:t>Fifth level</a:t>
             </a:r>
-            <a:endParaRPr lang="en-US"/>
+            <a:endParaRPr lang="en-US" dirty="0"/>
+          </a:p>
+        </p:txBody>
+      </p:sp>
+      <p:sp>
+        <p:nvSpPr>
+          <p:cNvPr id="4" name="Content Placeholder 3"/>
+          <p:cNvSpPr>
+            <a:spLocks noGrp="1"/>
+          </p:cNvSpPr>
+          <p:nvPr>
+            <p:ph sz="half" idx="2"/>
+          </p:nvPr>
+        </p:nvSpPr>
+        <p:spPr>
+          <a:xfrm>
+            <a:off x="6217920" y="1845735"/>
+            <a:ext cx="4937760" cy="4023360"/>
+          </a:xfrm>
+        </p:spPr>
+        <p:txBody>
+          <a:bodyPr/>
+          <a:lstStyle/>
+          <a:p>
+            <a:pPr lvl="0"/>
+            <a:r>
+              <a:rPr lang="en-US" smtClean="0"/>
+              <a:t>Click to edit Master text styles</a:t>
+            </a:r>
+          </a:p>
+          <a:p>
+            <a:pPr lvl="1"/>
+            <a:r>
+              <a:rPr lang="en-US" smtClean="0"/>
+              <a:t>Second level</a:t>
+            </a:r>
+          </a:p>
+          <a:p>
+            <a:pPr lvl="2"/>
+            <a:r>
+              <a:rPr lang="en-US" smtClean="0"/>
+              <a:t>Third level</a:t>
+            </a:r>
+          </a:p>
+          <a:p>
+            <a:pPr lvl="3"/>
+            <a:r>
+              <a:rPr lang="en-US" smtClean="0"/>
+              <a:t>Fourth level</a:t>
+            </a:r>
+          </a:p>
+          <a:p>
+            <a:pPr lvl="4"/>
+            <a:r>
+              <a:rPr lang="en-US" smtClean="0"/>
+              <a:t>Fifth level</a:t>
+            </a:r>
+            <a:endParaRPr lang="en-US" dirty="0"/>
           </a:p>
         </p:txBody>
       </p:sp>
@@ -1680,7 +2034,7 @@
           <a:p>
             <a:fld id="{48A87A34-81AB-432B-8DAE-1953F412C126}" type="datetimeFigureOut">
               <a:rPr lang="en-US" smtClean="0"/>
-              <a:t>4/27/17</a:t>
+              <a:t>4/28/17</a:t>
             </a:fld>
             <a:endParaRPr lang="en-US" dirty="0"/>
           </a:p>
@@ -1760,7 +2114,7 @@
       </p:grpSpPr>
       <p:sp>
         <p:nvSpPr>
-          <p:cNvPr id="2" name="Title 1"/>
+          <p:cNvPr id="10" name="Title 9"/>
           <p:cNvSpPr>
             <a:spLocks noGrp="1"/>
           </p:cNvSpPr>
@@ -1770,8 +2124,8 @@
         </p:nvSpPr>
         <p:spPr>
           <a:xfrm>
-            <a:off x="839788" y="365125"/>
-            <a:ext cx="10515600" cy="1325563"/>
+            <a:off x="1097280" y="286603"/>
+            <a:ext cx="10058400" cy="1450757"/>
           </a:xfrm>
         </p:spPr>
         <p:txBody>
@@ -1782,7 +2136,7 @@
               <a:rPr lang="en-US" smtClean="0"/>
               <a:t>Click to edit Master title style</a:t>
             </a:r>
-            <a:endParaRPr lang="en-US"/>
+            <a:endParaRPr lang="en-US" dirty="0"/>
           </a:p>
         </p:txBody>
       </p:sp>
@@ -1798,16 +2152,22 @@
         </p:nvSpPr>
         <p:spPr>
           <a:xfrm>
-            <a:off x="839788" y="1681163"/>
-            <a:ext cx="5157787" cy="823912"/>
+            <a:off x="1097280" y="1846052"/>
+            <a:ext cx="4937760" cy="736282"/>
           </a:xfrm>
         </p:spPr>
         <p:txBody>
-          <a:bodyPr anchor="b"/>
+          <a:bodyPr lIns="91440" rIns="91440" anchor="ctr">
+            <a:normAutofit/>
+          </a:bodyPr>
           <a:lstStyle>
             <a:lvl1pPr marL="0" indent="0">
               <a:buNone/>
-              <a:defRPr sz="2400" b="1"/>
+              <a:defRPr sz="2000" b="0" cap="all" baseline="0">
+                <a:solidFill>
+                  <a:schemeClr val="tx2"/>
+                </a:solidFill>
+              </a:defRPr>
             </a:lvl1pPr>
             <a:lvl2pPr marL="457200" indent="0">
               <a:buNone/>
@@ -1863,8 +2223,8 @@
         </p:nvSpPr>
         <p:spPr>
           <a:xfrm>
-            <a:off x="839788" y="2505075"/>
-            <a:ext cx="5157787" cy="3684588"/>
+            <a:off x="1097280" y="2582334"/>
+            <a:ext cx="4937760" cy="3378200"/>
           </a:xfrm>
         </p:spPr>
         <p:txBody>
@@ -1904,7 +2264,7 @@
               <a:rPr lang="en-US" smtClean="0"/>
               <a:t>Fifth level</a:t>
             </a:r>
-            <a:endParaRPr lang="en-US"/>
+            <a:endParaRPr lang="en-US" dirty="0"/>
           </a:p>
         </p:txBody>
       </p:sp>
@@ -1920,16 +2280,22 @@
         </p:nvSpPr>
         <p:spPr>
           <a:xfrm>
-            <a:off x="6172200" y="1681163"/>
-            <a:ext cx="5183188" cy="823912"/>
+            <a:off x="6217920" y="1846052"/>
+            <a:ext cx="4937760" cy="736282"/>
           </a:xfrm>
         </p:spPr>
         <p:txBody>
-          <a:bodyPr anchor="b"/>
+          <a:bodyPr lIns="91440" rIns="91440" anchor="ctr">
+            <a:normAutofit/>
+          </a:bodyPr>
           <a:lstStyle>
             <a:lvl1pPr marL="0" indent="0">
               <a:buNone/>
-              <a:defRPr sz="2400" b="1"/>
+              <a:defRPr sz="2000" b="0" cap="all" baseline="0">
+                <a:solidFill>
+                  <a:schemeClr val="tx2"/>
+                </a:solidFill>
+              </a:defRPr>
             </a:lvl1pPr>
             <a:lvl2pPr marL="457200" indent="0">
               <a:buNone/>
@@ -1985,8 +2351,8 @@
         </p:nvSpPr>
         <p:spPr>
           <a:xfrm>
-            <a:off x="6172200" y="2505075"/>
-            <a:ext cx="5183188" cy="3684588"/>
+            <a:off x="6217920" y="2582334"/>
+            <a:ext cx="4937760" cy="3378200"/>
           </a:xfrm>
         </p:spPr>
         <p:txBody>
@@ -2026,7 +2392,7 @@
               <a:rPr lang="en-US" smtClean="0"/>
               <a:t>Fifth level</a:t>
             </a:r>
-            <a:endParaRPr lang="en-US"/>
+            <a:endParaRPr lang="en-US" dirty="0"/>
           </a:p>
         </p:txBody>
       </p:sp>
@@ -2047,7 +2413,7 @@
           <a:p>
             <a:fld id="{48A87A34-81AB-432B-8DAE-1953F412C126}" type="datetimeFigureOut">
               <a:rPr lang="en-US" smtClean="0"/>
-              <a:t>4/27/17</a:t>
+              <a:t>4/28/17</a:t>
             </a:fld>
             <a:endParaRPr lang="en-US" dirty="0"/>
           </a:p>
@@ -2144,7 +2510,7 @@
               <a:rPr lang="en-US" smtClean="0"/>
               <a:t>Click to edit Master title style</a:t>
             </a:r>
-            <a:endParaRPr lang="en-US"/>
+            <a:endParaRPr lang="en-US" dirty="0"/>
           </a:p>
         </p:txBody>
       </p:sp>
@@ -2165,7 +2531,7 @@
           <a:p>
             <a:fld id="{48A87A34-81AB-432B-8DAE-1953F412C126}" type="datetimeFigureOut">
               <a:rPr lang="en-US" smtClean="0"/>
-              <a:t>4/27/17</a:t>
+              <a:t>4/28/17</a:t>
             </a:fld>
             <a:endParaRPr lang="en-US" dirty="0"/>
           </a:p>
@@ -2222,7 +2588,7 @@
 </file>
 
 <file path=ppt/slideLayouts/slideLayout7.xml><?xml version="1.0" encoding="utf-8"?>
-<p:sldLayout xmlns:a="http://schemas.openxmlformats.org/drawingml/2006/main" xmlns:r="http://schemas.openxmlformats.org/officeDocument/2006/relationships" xmlns:p="http://schemas.openxmlformats.org/presentationml/2006/main" type="blank" preserve="1">
+<p:sldLayout xmlns:a="http://schemas.openxmlformats.org/drawingml/2006/main" xmlns:r="http://schemas.openxmlformats.org/officeDocument/2006/relationships" xmlns:p="http://schemas.openxmlformats.org/presentationml/2006/main" showMasterSp="0" type="blank" preserve="1">
   <p:cSld name="Blank">
     <p:spTree>
       <p:nvGrpSpPr>
@@ -2240,7 +2606,83 @@
       </p:grpSpPr>
       <p:sp>
         <p:nvSpPr>
-          <p:cNvPr id="2" name="Date Placeholder 1"/>
+          <p:cNvPr id="5" name="Rectangle 4"/>
+          <p:cNvSpPr/>
+          <p:nvPr/>
+        </p:nvSpPr>
+        <p:spPr>
+          <a:xfrm>
+            <a:off x="3175" y="6400800"/>
+            <a:ext cx="12188825" cy="457200"/>
+          </a:xfrm>
+          <a:prstGeom prst="rect">
+            <a:avLst/>
+          </a:prstGeom>
+          <a:solidFill>
+            <a:schemeClr val="accent2"/>
+          </a:solidFill>
+          <a:ln>
+            <a:noFill/>
+          </a:ln>
+        </p:spPr>
+        <p:style>
+          <a:lnRef idx="2">
+            <a:schemeClr val="accent1">
+              <a:shade val="50000"/>
+            </a:schemeClr>
+          </a:lnRef>
+          <a:fillRef idx="1">
+            <a:schemeClr val="accent1"/>
+          </a:fillRef>
+          <a:effectRef idx="0">
+            <a:schemeClr val="accent1"/>
+          </a:effectRef>
+          <a:fontRef idx="minor">
+            <a:schemeClr val="lt1"/>
+          </a:fontRef>
+        </p:style>
+      </p:sp>
+      <p:sp>
+        <p:nvSpPr>
+          <p:cNvPr id="6" name="Rectangle 5"/>
+          <p:cNvSpPr/>
+          <p:nvPr/>
+        </p:nvSpPr>
+        <p:spPr>
+          <a:xfrm>
+            <a:off x="15" y="6334316"/>
+            <a:ext cx="12188825" cy="64008"/>
+          </a:xfrm>
+          <a:prstGeom prst="rect">
+            <a:avLst/>
+          </a:prstGeom>
+          <a:solidFill>
+            <a:schemeClr val="accent1"/>
+          </a:solidFill>
+          <a:ln>
+            <a:noFill/>
+          </a:ln>
+        </p:spPr>
+        <p:style>
+          <a:lnRef idx="2">
+            <a:schemeClr val="accent1">
+              <a:shade val="50000"/>
+            </a:schemeClr>
+          </a:lnRef>
+          <a:fillRef idx="1">
+            <a:schemeClr val="accent1"/>
+          </a:fillRef>
+          <a:effectRef idx="0">
+            <a:schemeClr val="accent1"/>
+          </a:effectRef>
+          <a:fontRef idx="minor">
+            <a:schemeClr val="lt1"/>
+          </a:fontRef>
+        </p:style>
+      </p:sp>
+      <p:sp>
+        <p:nvSpPr>
+          <p:cNvPr id="7" name="Date Placeholder 6"/>
           <p:cNvSpPr>
             <a:spLocks noGrp="1"/>
           </p:cNvSpPr>
@@ -2255,7 +2697,7 @@
           <a:p>
             <a:fld id="{48A87A34-81AB-432B-8DAE-1953F412C126}" type="datetimeFigureOut">
               <a:rPr lang="en-US" smtClean="0"/>
-              <a:t>4/27/17</a:t>
+              <a:t>4/28/17</a:t>
             </a:fld>
             <a:endParaRPr lang="en-US" dirty="0"/>
           </a:p>
@@ -2263,7 +2705,7 @@
       </p:sp>
       <p:sp>
         <p:nvSpPr>
-          <p:cNvPr id="3" name="Footer Placeholder 2"/>
+          <p:cNvPr id="8" name="Footer Placeholder 7"/>
           <p:cNvSpPr>
             <a:spLocks noGrp="1"/>
           </p:cNvSpPr>
@@ -2274,15 +2716,23 @@
         <p:spPr/>
         <p:txBody>
           <a:bodyPr/>
-          <a:lstStyle/>
-          <a:p>
-            <a:endParaRPr lang="en-US" dirty="0"/>
-          </a:p>
-        </p:txBody>
-      </p:sp>
-      <p:sp>
-        <p:nvSpPr>
-          <p:cNvPr id="4" name="Slide Number Placeholder 3"/>
+          <a:lstStyle>
+            <a:lvl1pPr>
+              <a:defRPr>
+                <a:solidFill>
+                  <a:srgbClr val="FFFFFF"/>
+                </a:solidFill>
+              </a:defRPr>
+            </a:lvl1pPr>
+          </a:lstStyle>
+          <a:p>
+            <a:endParaRPr lang="en-US" dirty="0"/>
+          </a:p>
+        </p:txBody>
+      </p:sp>
+      <p:sp>
+        <p:nvSpPr>
+          <p:cNvPr id="9" name="Slide Number Placeholder 8"/>
           <p:cNvSpPr>
             <a:spLocks noGrp="1"/>
           </p:cNvSpPr>
@@ -2317,7 +2767,7 @@
 </file>
 
 <file path=ppt/slideLayouts/slideLayout8.xml><?xml version="1.0" encoding="utf-8"?>
-<p:sldLayout xmlns:a="http://schemas.openxmlformats.org/drawingml/2006/main" xmlns:r="http://schemas.openxmlformats.org/officeDocument/2006/relationships" xmlns:p="http://schemas.openxmlformats.org/presentationml/2006/main" type="objTx" preserve="1">
+<p:sldLayout xmlns:a="http://schemas.openxmlformats.org/drawingml/2006/main" xmlns:r="http://schemas.openxmlformats.org/officeDocument/2006/relationships" xmlns:p="http://schemas.openxmlformats.org/presentationml/2006/main" showMasterSp="0" type="objTx" preserve="1">
   <p:cSld name="Content with Caption">
     <p:spTree>
       <p:nvGrpSpPr>
@@ -2335,25 +2785,107 @@
       </p:grpSpPr>
       <p:sp>
         <p:nvSpPr>
-          <p:cNvPr id="2" name="Title 1"/>
-          <p:cNvSpPr>
-            <a:spLocks noGrp="1"/>
-          </p:cNvSpPr>
-          <p:nvPr>
-            <p:ph type="title"/>
-          </p:nvPr>
+          <p:cNvPr id="8" name="Rectangle 7"/>
+          <p:cNvSpPr/>
+          <p:nvPr/>
         </p:nvSpPr>
         <p:spPr>
           <a:xfrm>
-            <a:off x="839788" y="457200"/>
-            <a:ext cx="3932237" cy="1600200"/>
+            <a:off x="16" y="0"/>
+            <a:ext cx="4050791" cy="6858000"/>
+          </a:xfrm>
+          <a:prstGeom prst="rect">
+            <a:avLst/>
+          </a:prstGeom>
+          <a:solidFill>
+            <a:schemeClr val="accent2"/>
+          </a:solidFill>
+          <a:ln>
+            <a:noFill/>
+          </a:ln>
+        </p:spPr>
+        <p:style>
+          <a:lnRef idx="2">
+            <a:schemeClr val="accent1">
+              <a:shade val="50000"/>
+            </a:schemeClr>
+          </a:lnRef>
+          <a:fillRef idx="1">
+            <a:schemeClr val="accent1"/>
+          </a:fillRef>
+          <a:effectRef idx="0">
+            <a:schemeClr val="accent1"/>
+          </a:effectRef>
+          <a:fontRef idx="minor">
+            <a:schemeClr val="lt1"/>
+          </a:fontRef>
+        </p:style>
+      </p:sp>
+      <p:sp>
+        <p:nvSpPr>
+          <p:cNvPr id="9" name="Rectangle 8"/>
+          <p:cNvSpPr/>
+          <p:nvPr/>
+        </p:nvSpPr>
+        <p:spPr>
+          <a:xfrm>
+            <a:off x="4040071" y="0"/>
+            <a:ext cx="64008" cy="6858000"/>
+          </a:xfrm>
+          <a:prstGeom prst="rect">
+            <a:avLst/>
+          </a:prstGeom>
+          <a:solidFill>
+            <a:schemeClr val="accent1"/>
+          </a:solidFill>
+          <a:ln>
+            <a:noFill/>
+          </a:ln>
+        </p:spPr>
+        <p:style>
+          <a:lnRef idx="2">
+            <a:schemeClr val="accent1">
+              <a:shade val="50000"/>
+            </a:schemeClr>
+          </a:lnRef>
+          <a:fillRef idx="1">
+            <a:schemeClr val="accent1"/>
+          </a:fillRef>
+          <a:effectRef idx="0">
+            <a:schemeClr val="accent1"/>
+          </a:effectRef>
+          <a:fontRef idx="minor">
+            <a:schemeClr val="lt1"/>
+          </a:fontRef>
+        </p:style>
+      </p:sp>
+      <p:sp>
+        <p:nvSpPr>
+          <p:cNvPr id="2" name="Title 1"/>
+          <p:cNvSpPr>
+            <a:spLocks noGrp="1"/>
+          </p:cNvSpPr>
+          <p:nvPr>
+            <p:ph type="title"/>
+          </p:nvPr>
+        </p:nvSpPr>
+        <p:spPr>
+          <a:xfrm>
+            <a:off x="457200" y="594359"/>
+            <a:ext cx="3200400" cy="2286000"/>
           </a:xfrm>
         </p:spPr>
         <p:txBody>
-          <a:bodyPr anchor="b"/>
+          <a:bodyPr anchor="b">
+            <a:normAutofit/>
+          </a:bodyPr>
           <a:lstStyle>
             <a:lvl1pPr>
-              <a:defRPr sz="3200"/>
+              <a:defRPr sz="3600" b="0">
+                <a:solidFill>
+                  <a:srgbClr val="FFFFFF"/>
+                </a:solidFill>
+              </a:defRPr>
             </a:lvl1pPr>
           </a:lstStyle>
           <a:p>
@@ -2361,7 +2893,7 @@
               <a:rPr lang="en-US" smtClean="0"/>
               <a:t>Click to edit Master title style</a:t>
             </a:r>
-            <a:endParaRPr lang="en-US"/>
+            <a:endParaRPr lang="en-US" dirty="0"/>
           </a:p>
         </p:txBody>
       </p:sp>
@@ -2377,200 +2909,208 @@
         </p:nvSpPr>
         <p:spPr>
           <a:xfrm>
-            <a:off x="5183188" y="987425"/>
-            <a:ext cx="6172200" cy="4873625"/>
+            <a:off x="4800600" y="731520"/>
+            <a:ext cx="6492240" cy="5257800"/>
           </a:xfrm>
         </p:spPr>
+        <p:txBody>
+          <a:bodyPr/>
+          <a:lstStyle/>
+          <a:p>
+            <a:pPr lvl="0"/>
+            <a:r>
+              <a:rPr lang="en-US" smtClean="0"/>
+              <a:t>Click to edit Master text styles</a:t>
+            </a:r>
+          </a:p>
+          <a:p>
+            <a:pPr lvl="1"/>
+            <a:r>
+              <a:rPr lang="en-US" smtClean="0"/>
+              <a:t>Second level</a:t>
+            </a:r>
+          </a:p>
+          <a:p>
+            <a:pPr lvl="2"/>
+            <a:r>
+              <a:rPr lang="en-US" smtClean="0"/>
+              <a:t>Third level</a:t>
+            </a:r>
+          </a:p>
+          <a:p>
+            <a:pPr lvl="3"/>
+            <a:r>
+              <a:rPr lang="en-US" smtClean="0"/>
+              <a:t>Fourth level</a:t>
+            </a:r>
+          </a:p>
+          <a:p>
+            <a:pPr lvl="4"/>
+            <a:r>
+              <a:rPr lang="en-US" smtClean="0"/>
+              <a:t>Fifth level</a:t>
+            </a:r>
+            <a:endParaRPr lang="en-US" dirty="0"/>
+          </a:p>
+        </p:txBody>
+      </p:sp>
+      <p:sp>
+        <p:nvSpPr>
+          <p:cNvPr id="4" name="Text Placeholder 3"/>
+          <p:cNvSpPr>
+            <a:spLocks noGrp="1"/>
+          </p:cNvSpPr>
+          <p:nvPr>
+            <p:ph type="body" sz="half" idx="2"/>
+          </p:nvPr>
+        </p:nvSpPr>
+        <p:spPr>
+          <a:xfrm>
+            <a:off x="457200" y="2926080"/>
+            <a:ext cx="3200400" cy="3379124"/>
+          </a:xfrm>
+        </p:spPr>
+        <p:txBody>
+          <a:bodyPr lIns="91440" rIns="91440">
+            <a:normAutofit/>
+          </a:bodyPr>
+          <a:lstStyle>
+            <a:lvl1pPr marL="0" indent="0">
+              <a:buNone/>
+              <a:defRPr sz="1500">
+                <a:solidFill>
+                  <a:srgbClr val="FFFFFF"/>
+                </a:solidFill>
+              </a:defRPr>
+            </a:lvl1pPr>
+            <a:lvl2pPr marL="457200" indent="0">
+              <a:buNone/>
+              <a:defRPr sz="1200"/>
+            </a:lvl2pPr>
+            <a:lvl3pPr marL="914400" indent="0">
+              <a:buNone/>
+              <a:defRPr sz="1000"/>
+            </a:lvl3pPr>
+            <a:lvl4pPr marL="1371600" indent="0">
+              <a:buNone/>
+              <a:defRPr sz="900"/>
+            </a:lvl4pPr>
+            <a:lvl5pPr marL="1828800" indent="0">
+              <a:buNone/>
+              <a:defRPr sz="900"/>
+            </a:lvl5pPr>
+            <a:lvl6pPr marL="2286000" indent="0">
+              <a:buNone/>
+              <a:defRPr sz="900"/>
+            </a:lvl6pPr>
+            <a:lvl7pPr marL="2743200" indent="0">
+              <a:buNone/>
+              <a:defRPr sz="900"/>
+            </a:lvl7pPr>
+            <a:lvl8pPr marL="3200400" indent="0">
+              <a:buNone/>
+              <a:defRPr sz="900"/>
+            </a:lvl8pPr>
+            <a:lvl9pPr marL="3657600" indent="0">
+              <a:buNone/>
+              <a:defRPr sz="900"/>
+            </a:lvl9pPr>
+          </a:lstStyle>
+          <a:p>
+            <a:pPr lvl="0"/>
+            <a:r>
+              <a:rPr lang="en-US" smtClean="0"/>
+              <a:t>Click to edit Master text styles</a:t>
+            </a:r>
+          </a:p>
+        </p:txBody>
+      </p:sp>
+      <p:sp>
+        <p:nvSpPr>
+          <p:cNvPr id="5" name="Date Placeholder 4"/>
+          <p:cNvSpPr>
+            <a:spLocks noGrp="1"/>
+          </p:cNvSpPr>
+          <p:nvPr>
+            <p:ph type="dt" sz="half" idx="10"/>
+          </p:nvPr>
+        </p:nvSpPr>
+        <p:spPr>
+          <a:xfrm>
+            <a:off x="465512" y="6459785"/>
+            <a:ext cx="2618510" cy="365125"/>
+          </a:xfrm>
+        </p:spPr>
+        <p:txBody>
+          <a:bodyPr/>
+          <a:lstStyle>
+            <a:lvl1pPr algn="l">
+              <a:defRPr/>
+            </a:lvl1pPr>
+          </a:lstStyle>
+          <a:p>
+            <a:fld id="{48A87A34-81AB-432B-8DAE-1953F412C126}" type="datetimeFigureOut">
+              <a:rPr lang="en-US" smtClean="0"/>
+              <a:t>4/28/17</a:t>
+            </a:fld>
+            <a:endParaRPr lang="en-US" dirty="0"/>
+          </a:p>
+        </p:txBody>
+      </p:sp>
+      <p:sp>
+        <p:nvSpPr>
+          <p:cNvPr id="6" name="Footer Placeholder 5"/>
+          <p:cNvSpPr>
+            <a:spLocks noGrp="1"/>
+          </p:cNvSpPr>
+          <p:nvPr>
+            <p:ph type="ftr" sz="quarter" idx="11"/>
+          </p:nvPr>
+        </p:nvSpPr>
+        <p:spPr>
+          <a:xfrm>
+            <a:off x="4800600" y="6459785"/>
+            <a:ext cx="4648200" cy="365125"/>
+          </a:xfrm>
+        </p:spPr>
+        <p:txBody>
+          <a:bodyPr/>
+          <a:lstStyle>
+            <a:lvl1pPr algn="l">
+              <a:defRPr>
+                <a:solidFill>
+                  <a:schemeClr val="tx2"/>
+                </a:solidFill>
+              </a:defRPr>
+            </a:lvl1pPr>
+          </a:lstStyle>
+          <a:p>
+            <a:endParaRPr lang="en-US" dirty="0"/>
+          </a:p>
+        </p:txBody>
+      </p:sp>
+      <p:sp>
+        <p:nvSpPr>
+          <p:cNvPr id="7" name="Slide Number Placeholder 6"/>
+          <p:cNvSpPr>
+            <a:spLocks noGrp="1"/>
+          </p:cNvSpPr>
+          <p:nvPr>
+            <p:ph type="sldNum" sz="quarter" idx="12"/>
+          </p:nvPr>
+        </p:nvSpPr>
+        <p:spPr/>
         <p:txBody>
           <a:bodyPr/>
           <a:lstStyle>
             <a:lvl1pPr>
-              <a:defRPr sz="3200"/>
+              <a:defRPr>
+                <a:solidFill>
+                  <a:schemeClr val="tx2"/>
+                </a:solidFill>
+              </a:defRPr>
             </a:lvl1pPr>
-            <a:lvl2pPr>
-              <a:defRPr sz="2800"/>
-            </a:lvl2pPr>
-            <a:lvl3pPr>
-              <a:defRPr sz="2400"/>
-            </a:lvl3pPr>
-            <a:lvl4pPr>
-              <a:defRPr sz="2000"/>
-            </a:lvl4pPr>
-            <a:lvl5pPr>
-              <a:defRPr sz="2000"/>
-            </a:lvl5pPr>
-            <a:lvl6pPr>
-              <a:defRPr sz="2000"/>
-            </a:lvl6pPr>
-            <a:lvl7pPr>
-              <a:defRPr sz="2000"/>
-            </a:lvl7pPr>
-            <a:lvl8pPr>
-              <a:defRPr sz="2000"/>
-            </a:lvl8pPr>
-            <a:lvl9pPr>
-              <a:defRPr sz="2000"/>
-            </a:lvl9pPr>
           </a:lstStyle>
-          <a:p>
-            <a:pPr lvl="0"/>
-            <a:r>
-              <a:rPr lang="en-US" smtClean="0"/>
-              <a:t>Click to edit Master text styles</a:t>
-            </a:r>
-          </a:p>
-          <a:p>
-            <a:pPr lvl="1"/>
-            <a:r>
-              <a:rPr lang="en-US" smtClean="0"/>
-              <a:t>Second level</a:t>
-            </a:r>
-          </a:p>
-          <a:p>
-            <a:pPr lvl="2"/>
-            <a:r>
-              <a:rPr lang="en-US" smtClean="0"/>
-              <a:t>Third level</a:t>
-            </a:r>
-          </a:p>
-          <a:p>
-            <a:pPr lvl="3"/>
-            <a:r>
-              <a:rPr lang="en-US" smtClean="0"/>
-              <a:t>Fourth level</a:t>
-            </a:r>
-          </a:p>
-          <a:p>
-            <a:pPr lvl="4"/>
-            <a:r>
-              <a:rPr lang="en-US" smtClean="0"/>
-              <a:t>Fifth level</a:t>
-            </a:r>
-            <a:endParaRPr lang="en-US"/>
-          </a:p>
-        </p:txBody>
-      </p:sp>
-      <p:sp>
-        <p:nvSpPr>
-          <p:cNvPr id="4" name="Text Placeholder 3"/>
-          <p:cNvSpPr>
-            <a:spLocks noGrp="1"/>
-          </p:cNvSpPr>
-          <p:nvPr>
-            <p:ph type="body" sz="half" idx="2"/>
-          </p:nvPr>
-        </p:nvSpPr>
-        <p:spPr>
-          <a:xfrm>
-            <a:off x="839788" y="2057400"/>
-            <a:ext cx="3932237" cy="3811588"/>
-          </a:xfrm>
-        </p:spPr>
-        <p:txBody>
-          <a:bodyPr/>
-          <a:lstStyle>
-            <a:lvl1pPr marL="0" indent="0">
-              <a:buNone/>
-              <a:defRPr sz="1600"/>
-            </a:lvl1pPr>
-            <a:lvl2pPr marL="457200" indent="0">
-              <a:buNone/>
-              <a:defRPr sz="1400"/>
-            </a:lvl2pPr>
-            <a:lvl3pPr marL="914400" indent="0">
-              <a:buNone/>
-              <a:defRPr sz="1200"/>
-            </a:lvl3pPr>
-            <a:lvl4pPr marL="1371600" indent="0">
-              <a:buNone/>
-              <a:defRPr sz="1000"/>
-            </a:lvl4pPr>
-            <a:lvl5pPr marL="1828800" indent="0">
-              <a:buNone/>
-              <a:defRPr sz="1000"/>
-            </a:lvl5pPr>
-            <a:lvl6pPr marL="2286000" indent="0">
-              <a:buNone/>
-              <a:defRPr sz="1000"/>
-            </a:lvl6pPr>
-            <a:lvl7pPr marL="2743200" indent="0">
-              <a:buNone/>
-              <a:defRPr sz="1000"/>
-            </a:lvl7pPr>
-            <a:lvl8pPr marL="3200400" indent="0">
-              <a:buNone/>
-              <a:defRPr sz="1000"/>
-            </a:lvl8pPr>
-            <a:lvl9pPr marL="3657600" indent="0">
-              <a:buNone/>
-              <a:defRPr sz="1000"/>
-            </a:lvl9pPr>
-          </a:lstStyle>
-          <a:p>
-            <a:pPr lvl="0"/>
-            <a:r>
-              <a:rPr lang="en-US" smtClean="0"/>
-              <a:t>Click to edit Master text styles</a:t>
-            </a:r>
-          </a:p>
-        </p:txBody>
-      </p:sp>
-      <p:sp>
-        <p:nvSpPr>
-          <p:cNvPr id="5" name="Date Placeholder 4"/>
-          <p:cNvSpPr>
-            <a:spLocks noGrp="1"/>
-          </p:cNvSpPr>
-          <p:nvPr>
-            <p:ph type="dt" sz="half" idx="10"/>
-          </p:nvPr>
-        </p:nvSpPr>
-        <p:spPr/>
-        <p:txBody>
-          <a:bodyPr/>
-          <a:lstStyle/>
-          <a:p>
-            <a:fld id="{48A87A34-81AB-432B-8DAE-1953F412C126}" type="datetimeFigureOut">
-              <a:rPr lang="en-US" smtClean="0"/>
-              <a:t>4/27/17</a:t>
-            </a:fld>
-            <a:endParaRPr lang="en-US" dirty="0"/>
-          </a:p>
-        </p:txBody>
-      </p:sp>
-      <p:sp>
-        <p:nvSpPr>
-          <p:cNvPr id="6" name="Footer Placeholder 5"/>
-          <p:cNvSpPr>
-            <a:spLocks noGrp="1"/>
-          </p:cNvSpPr>
-          <p:nvPr>
-            <p:ph type="ftr" sz="quarter" idx="11"/>
-          </p:nvPr>
-        </p:nvSpPr>
-        <p:spPr/>
-        <p:txBody>
-          <a:bodyPr/>
-          <a:lstStyle/>
-          <a:p>
-            <a:endParaRPr lang="en-US" dirty="0"/>
-          </a:p>
-        </p:txBody>
-      </p:sp>
-      <p:sp>
-        <p:nvSpPr>
-          <p:cNvPr id="7" name="Slide Number Placeholder 6"/>
-          <p:cNvSpPr>
-            <a:spLocks noGrp="1"/>
-          </p:cNvSpPr>
-          <p:nvPr>
-            <p:ph type="sldNum" sz="quarter" idx="12"/>
-          </p:nvPr>
-        </p:nvSpPr>
-        <p:spPr/>
-        <p:txBody>
-          <a:bodyPr/>
-          <a:lstStyle/>
           <a:p>
             <a:fld id="{6D22F896-40B5-4ADD-8801-0D06FADFA095}" type="slidenum">
               <a:rPr lang="en-US" smtClean="0"/>
@@ -2594,7 +3134,7 @@
 </file>
 
 <file path=ppt/slideLayouts/slideLayout9.xml><?xml version="1.0" encoding="utf-8"?>
-<p:sldLayout xmlns:a="http://schemas.openxmlformats.org/drawingml/2006/main" xmlns:r="http://schemas.openxmlformats.org/officeDocument/2006/relationships" xmlns:p="http://schemas.openxmlformats.org/presentationml/2006/main" type="picTx" preserve="1">
+<p:sldLayout xmlns:a="http://schemas.openxmlformats.org/drawingml/2006/main" xmlns:r="http://schemas.openxmlformats.org/officeDocument/2006/relationships" xmlns:p="http://schemas.openxmlformats.org/presentationml/2006/main" showMasterSp="0" type="picTx" preserve="1">
   <p:cSld name="Picture with Caption">
     <p:spTree>
       <p:nvGrpSpPr>
@@ -2612,25 +3152,107 @@
       </p:grpSpPr>
       <p:sp>
         <p:nvSpPr>
-          <p:cNvPr id="2" name="Title 1"/>
-          <p:cNvSpPr>
-            <a:spLocks noGrp="1"/>
-          </p:cNvSpPr>
-          <p:nvPr>
-            <p:ph type="title"/>
-          </p:nvPr>
+          <p:cNvPr id="8" name="Rectangle 7"/>
+          <p:cNvSpPr/>
+          <p:nvPr/>
         </p:nvSpPr>
         <p:spPr>
           <a:xfrm>
-            <a:off x="839788" y="457200"/>
-            <a:ext cx="3932237" cy="1600200"/>
+            <a:off x="0" y="4953000"/>
+            <a:ext cx="12188825" cy="1905000"/>
+          </a:xfrm>
+          <a:prstGeom prst="rect">
+            <a:avLst/>
+          </a:prstGeom>
+          <a:solidFill>
+            <a:schemeClr val="accent2"/>
+          </a:solidFill>
+          <a:ln>
+            <a:noFill/>
+          </a:ln>
+        </p:spPr>
+        <p:style>
+          <a:lnRef idx="2">
+            <a:schemeClr val="accent1">
+              <a:shade val="50000"/>
+            </a:schemeClr>
+          </a:lnRef>
+          <a:fillRef idx="1">
+            <a:schemeClr val="accent1"/>
+          </a:fillRef>
+          <a:effectRef idx="0">
+            <a:schemeClr val="accent1"/>
+          </a:effectRef>
+          <a:fontRef idx="minor">
+            <a:schemeClr val="lt1"/>
+          </a:fontRef>
+        </p:style>
+      </p:sp>
+      <p:sp>
+        <p:nvSpPr>
+          <p:cNvPr id="9" name="Rectangle 8"/>
+          <p:cNvSpPr/>
+          <p:nvPr/>
+        </p:nvSpPr>
+        <p:spPr>
+          <a:xfrm>
+            <a:off x="15" y="4915076"/>
+            <a:ext cx="12188825" cy="64008"/>
+          </a:xfrm>
+          <a:prstGeom prst="rect">
+            <a:avLst/>
+          </a:prstGeom>
+          <a:solidFill>
+            <a:schemeClr val="accent1"/>
+          </a:solidFill>
+          <a:ln>
+            <a:noFill/>
+          </a:ln>
+        </p:spPr>
+        <p:style>
+          <a:lnRef idx="2">
+            <a:schemeClr val="accent1">
+              <a:shade val="50000"/>
+            </a:schemeClr>
+          </a:lnRef>
+          <a:fillRef idx="1">
+            <a:schemeClr val="accent1"/>
+          </a:fillRef>
+          <a:effectRef idx="0">
+            <a:schemeClr val="accent1"/>
+          </a:effectRef>
+          <a:fontRef idx="minor">
+            <a:schemeClr val="lt1"/>
+          </a:fontRef>
+        </p:style>
+      </p:sp>
+      <p:sp>
+        <p:nvSpPr>
+          <p:cNvPr id="2" name="Title 1"/>
+          <p:cNvSpPr>
+            <a:spLocks noGrp="1"/>
+          </p:cNvSpPr>
+          <p:nvPr>
+            <p:ph type="title"/>
+          </p:nvPr>
+        </p:nvSpPr>
+        <p:spPr>
+          <a:xfrm>
+            <a:off x="1097280" y="5074920"/>
+            <a:ext cx="10113264" cy="822960"/>
           </a:xfrm>
         </p:spPr>
         <p:txBody>
-          <a:bodyPr anchor="b"/>
+          <a:bodyPr lIns="91440" tIns="0" rIns="91440" bIns="0" anchor="b">
+            <a:noAutofit/>
+          </a:bodyPr>
           <a:lstStyle>
             <a:lvl1pPr>
-              <a:defRPr sz="3200"/>
+              <a:defRPr sz="3600" b="0">
+                <a:solidFill>
+                  <a:srgbClr val="FFFFFF"/>
+                </a:solidFill>
+              </a:defRPr>
             </a:lvl1pPr>
           </a:lstStyle>
           <a:p>
@@ -2638,7 +3260,7 @@
               <a:rPr lang="en-US" smtClean="0"/>
               <a:t>Click to edit Master title style</a:t>
             </a:r>
-            <a:endParaRPr lang="en-US"/>
+            <a:endParaRPr lang="en-US" dirty="0"/>
           </a:p>
         </p:txBody>
       </p:sp>
@@ -2646,7 +3268,7 @@
         <p:nvSpPr>
           <p:cNvPr id="3" name="Picture Placeholder 2"/>
           <p:cNvSpPr>
-            <a:spLocks noGrp="1"/>
+            <a:spLocks noGrp="1" noChangeAspect="1"/>
           </p:cNvSpPr>
           <p:nvPr>
             <p:ph type="pic" idx="1"/>
@@ -2654,16 +3276,23 @@
         </p:nvSpPr>
         <p:spPr>
           <a:xfrm>
-            <a:off x="5183188" y="987425"/>
-            <a:ext cx="6172200" cy="4873625"/>
+            <a:off x="15" y="0"/>
+            <a:ext cx="12191985" cy="4915076"/>
           </a:xfrm>
+          <a:solidFill>
+            <a:schemeClr val="accent2"/>
+          </a:solidFill>
         </p:spPr>
         <p:txBody>
-          <a:bodyPr/>
+          <a:bodyPr lIns="457200" tIns="457200" anchor="t"/>
           <a:lstStyle>
             <a:lvl1pPr marL="0" indent="0">
               <a:buNone/>
-              <a:defRPr sz="3200"/>
+              <a:defRPr sz="3200">
+                <a:solidFill>
+                  <a:schemeClr val="bg1"/>
+                </a:solidFill>
+              </a:defRPr>
             </a:lvl1pPr>
             <a:lvl2pPr marL="457200" indent="0">
               <a:buNone/>
@@ -2699,7 +3328,11 @@
             </a:lvl9pPr>
           </a:lstStyle>
           <a:p>
-            <a:endParaRPr lang="en-US"/>
+            <a:r>
+              <a:rPr lang="en-US" smtClean="0"/>
+              <a:t>Drag picture to placeholder or click icon to add</a:t>
+            </a:r>
+            <a:endParaRPr lang="en-US" dirty="0"/>
           </a:p>
         </p:txBody>
       </p:sp>
@@ -2715,48 +3348,60 @@
         </p:nvSpPr>
         <p:spPr>
           <a:xfrm>
-            <a:off x="839788" y="2057400"/>
-            <a:ext cx="3932237" cy="3811588"/>
+            <a:off x="1097280" y="5907023"/>
+            <a:ext cx="10113264" cy="594360"/>
           </a:xfrm>
         </p:spPr>
         <p:txBody>
-          <a:bodyPr/>
+          <a:bodyPr lIns="91440" tIns="0" rIns="91440" bIns="0">
+            <a:normAutofit/>
+          </a:bodyPr>
           <a:lstStyle>
             <a:lvl1pPr marL="0" indent="0">
+              <a:spcBef>
+                <a:spcPts val="0"/>
+              </a:spcBef>
+              <a:spcAft>
+                <a:spcPts val="600"/>
+              </a:spcAft>
               <a:buNone/>
-              <a:defRPr sz="1600"/>
+              <a:defRPr sz="1500">
+                <a:solidFill>
+                  <a:srgbClr val="FFFFFF"/>
+                </a:solidFill>
+              </a:defRPr>
             </a:lvl1pPr>
             <a:lvl2pPr marL="457200" indent="0">
               <a:buNone/>
-              <a:defRPr sz="1400"/>
+              <a:defRPr sz="1200"/>
             </a:lvl2pPr>
             <a:lvl3pPr marL="914400" indent="0">
               <a:buNone/>
-              <a:defRPr sz="1200"/>
+              <a:defRPr sz="1000"/>
             </a:lvl3pPr>
             <a:lvl4pPr marL="1371600" indent="0">
               <a:buNone/>
-              <a:defRPr sz="1000"/>
+              <a:defRPr sz="900"/>
             </a:lvl4pPr>
             <a:lvl5pPr marL="1828800" indent="0">
               <a:buNone/>
-              <a:defRPr sz="1000"/>
+              <a:defRPr sz="900"/>
             </a:lvl5pPr>
             <a:lvl6pPr marL="2286000" indent="0">
               <a:buNone/>
-              <a:defRPr sz="1000"/>
+              <a:defRPr sz="900"/>
             </a:lvl6pPr>
             <a:lvl7pPr marL="2743200" indent="0">
               <a:buNone/>
-              <a:defRPr sz="1000"/>
+              <a:defRPr sz="900"/>
             </a:lvl7pPr>
             <a:lvl8pPr marL="3200400" indent="0">
               <a:buNone/>
-              <a:defRPr sz="1000"/>
+              <a:defRPr sz="900"/>
             </a:lvl8pPr>
             <a:lvl9pPr marL="3657600" indent="0">
               <a:buNone/>
-              <a:defRPr sz="1000"/>
+              <a:defRPr sz="900"/>
             </a:lvl9pPr>
           </a:lstStyle>
           <a:p>
@@ -2785,7 +3430,7 @@
           <a:p>
             <a:fld id="{48A87A34-81AB-432B-8DAE-1953F412C126}" type="datetimeFigureOut">
               <a:rPr lang="en-US" smtClean="0"/>
-              <a:t>4/27/17</a:t>
+              <a:t>4/28/17</a:t>
             </a:fld>
             <a:endParaRPr lang="en-US" dirty="0"/>
           </a:p>
@@ -2865,25 +3510,101 @@
       </p:grpSpPr>
       <p:sp>
         <p:nvSpPr>
-          <p:cNvPr id="2" name="Title Placeholder 1"/>
-          <p:cNvSpPr>
-            <a:spLocks noGrp="1"/>
-          </p:cNvSpPr>
-          <p:nvPr>
-            <p:ph type="title"/>
-          </p:nvPr>
+          <p:cNvPr id="7" name="Rectangle 6"/>
+          <p:cNvSpPr/>
+          <p:nvPr/>
         </p:nvSpPr>
         <p:spPr>
           <a:xfrm>
-            <a:off x="838200" y="365125"/>
-            <a:ext cx="10515600" cy="1325563"/>
+            <a:off x="1" y="6400800"/>
+            <a:ext cx="12192000" cy="457200"/>
+          </a:xfrm>
+          <a:prstGeom prst="rect">
+            <a:avLst/>
+          </a:prstGeom>
+          <a:solidFill>
+            <a:schemeClr val="accent2"/>
+          </a:solidFill>
+          <a:ln>
+            <a:noFill/>
+          </a:ln>
+        </p:spPr>
+        <p:style>
+          <a:lnRef idx="2">
+            <a:schemeClr val="accent1">
+              <a:shade val="50000"/>
+            </a:schemeClr>
+          </a:lnRef>
+          <a:fillRef idx="1">
+            <a:schemeClr val="accent1"/>
+          </a:fillRef>
+          <a:effectRef idx="0">
+            <a:schemeClr val="accent1"/>
+          </a:effectRef>
+          <a:fontRef idx="minor">
+            <a:schemeClr val="lt1"/>
+          </a:fontRef>
+        </p:style>
+      </p:sp>
+      <p:sp>
+        <p:nvSpPr>
+          <p:cNvPr id="9" name="Rectangle 8"/>
+          <p:cNvSpPr/>
+          <p:nvPr/>
+        </p:nvSpPr>
+        <p:spPr>
+          <a:xfrm>
+            <a:off x="0" y="6334316"/>
+            <a:ext cx="12192001" cy="65998"/>
+          </a:xfrm>
+          <a:prstGeom prst="rect">
+            <a:avLst/>
+          </a:prstGeom>
+          <a:solidFill>
+            <a:schemeClr val="accent1"/>
+          </a:solidFill>
+          <a:ln>
+            <a:noFill/>
+          </a:ln>
+        </p:spPr>
+        <p:style>
+          <a:lnRef idx="2">
+            <a:schemeClr val="accent1">
+              <a:shade val="50000"/>
+            </a:schemeClr>
+          </a:lnRef>
+          <a:fillRef idx="1">
+            <a:schemeClr val="accent1"/>
+          </a:fillRef>
+          <a:effectRef idx="0">
+            <a:schemeClr val="accent1"/>
+          </a:effectRef>
+          <a:fontRef idx="minor">
+            <a:schemeClr val="lt1"/>
+          </a:fontRef>
+        </p:style>
+      </p:sp>
+      <p:sp>
+        <p:nvSpPr>
+          <p:cNvPr id="2" name="Title Placeholder 1"/>
+          <p:cNvSpPr>
+            <a:spLocks noGrp="1"/>
+          </p:cNvSpPr>
+          <p:nvPr>
+            <p:ph type="title"/>
+          </p:nvPr>
+        </p:nvSpPr>
+        <p:spPr>
+          <a:xfrm>
+            <a:off x="1097280" y="286603"/>
+            <a:ext cx="10058400" cy="1450757"/>
           </a:xfrm>
           <a:prstGeom prst="rect">
             <a:avLst/>
           </a:prstGeom>
         </p:spPr>
         <p:txBody>
-          <a:bodyPr vert="horz" lIns="91440" tIns="45720" rIns="91440" bIns="45720" rtlCol="0" anchor="ctr">
+          <a:bodyPr vert="horz" lIns="91440" tIns="45720" rIns="91440" bIns="45720" rtlCol="0" anchor="b">
             <a:normAutofit/>
           </a:bodyPr>
           <a:lstStyle/>
@@ -2892,7 +3613,7 @@
               <a:rPr lang="en-US" smtClean="0"/>
               <a:t>Click to edit Master title style</a:t>
             </a:r>
-            <a:endParaRPr lang="en-US"/>
+            <a:endParaRPr lang="en-US" dirty="0"/>
           </a:p>
         </p:txBody>
       </p:sp>
@@ -2908,15 +3629,15 @@
         </p:nvSpPr>
         <p:spPr>
           <a:xfrm>
-            <a:off x="838200" y="1825625"/>
-            <a:ext cx="10515600" cy="4351338"/>
+            <a:off x="1097280" y="1845734"/>
+            <a:ext cx="10058400" cy="4023360"/>
           </a:xfrm>
           <a:prstGeom prst="rect">
             <a:avLst/>
           </a:prstGeom>
         </p:spPr>
         <p:txBody>
-          <a:bodyPr vert="horz" lIns="91440" tIns="45720" rIns="91440" bIns="45720" rtlCol="0">
+          <a:bodyPr vert="horz" lIns="0" tIns="45720" rIns="0" bIns="45720" rtlCol="0">
             <a:normAutofit/>
           </a:bodyPr>
           <a:lstStyle/>
@@ -2954,7 +3675,7 @@
               <a:rPr lang="en-US" smtClean="0"/>
               <a:t>Fifth level</a:t>
             </a:r>
-            <a:endParaRPr lang="en-US"/>
+            <a:endParaRPr lang="en-US" dirty="0"/>
           </a:p>
         </p:txBody>
       </p:sp>
@@ -2970,8 +3691,8 @@
         </p:nvSpPr>
         <p:spPr>
           <a:xfrm>
-            <a:off x="838200" y="6356350"/>
-            <a:ext cx="2743200" cy="365125"/>
+            <a:off x="1097280" y="6459785"/>
+            <a:ext cx="2472271" cy="365125"/>
           </a:xfrm>
           <a:prstGeom prst="rect">
             <a:avLst/>
@@ -2981,11 +3702,9 @@
           <a:bodyPr vert="horz" lIns="91440" tIns="45720" rIns="91440" bIns="45720" rtlCol="0" anchor="ctr"/>
           <a:lstStyle>
             <a:lvl1pPr algn="l">
-              <a:defRPr sz="1200">
+              <a:defRPr sz="900">
                 <a:solidFill>
-                  <a:schemeClr val="tx1">
-                    <a:tint val="75000"/>
-                  </a:schemeClr>
+                  <a:srgbClr val="FFFFFF"/>
                 </a:solidFill>
               </a:defRPr>
             </a:lvl1pPr>
@@ -2994,7 +3713,7 @@
             <a:fld id="{48A87A34-81AB-432B-8DAE-1953F412C126}" type="datetimeFigureOut">
               <a:rPr lang="en-US" smtClean="0"/>
               <a:pPr/>
-              <a:t>4/27/17</a:t>
+              <a:t>4/28/17</a:t>
             </a:fld>
             <a:endParaRPr lang="en-US" dirty="0"/>
           </a:p>
@@ -3012,8 +3731,8 @@
         </p:nvSpPr>
         <p:spPr>
           <a:xfrm>
-            <a:off x="4038600" y="6356350"/>
-            <a:ext cx="4114800" cy="365125"/>
+            <a:off x="3686185" y="6459785"/>
+            <a:ext cx="4822804" cy="365125"/>
           </a:xfrm>
           <a:prstGeom prst="rect">
             <a:avLst/>
@@ -3023,11 +3742,9 @@
           <a:bodyPr vert="horz" lIns="91440" tIns="45720" rIns="91440" bIns="45720" rtlCol="0" anchor="ctr"/>
           <a:lstStyle>
             <a:lvl1pPr algn="ctr">
-              <a:defRPr sz="1200">
+              <a:defRPr sz="900" cap="all" baseline="0">
                 <a:solidFill>
-                  <a:schemeClr val="tx1">
-                    <a:tint val="75000"/>
-                  </a:schemeClr>
+                  <a:srgbClr val="FFFFFF"/>
                 </a:solidFill>
               </a:defRPr>
             </a:lvl1pPr>
@@ -3049,8 +3766,8 @@
         </p:nvSpPr>
         <p:spPr>
           <a:xfrm>
-            <a:off x="8610600" y="6356350"/>
-            <a:ext cx="2743200" cy="365125"/>
+            <a:off x="9900458" y="6459785"/>
+            <a:ext cx="1312025" cy="365125"/>
           </a:xfrm>
           <a:prstGeom prst="rect">
             <a:avLst/>
@@ -3060,11 +3777,9 @@
           <a:bodyPr vert="horz" lIns="91440" tIns="45720" rIns="91440" bIns="45720" rtlCol="0" anchor="ctr"/>
           <a:lstStyle>
             <a:lvl1pPr algn="r">
-              <a:defRPr sz="1200">
+              <a:defRPr sz="1050">
                 <a:solidFill>
-                  <a:schemeClr val="tx1">
-                    <a:tint val="75000"/>
-                  </a:schemeClr>
+                  <a:srgbClr val="FFFFFF"/>
                 </a:solidFill>
               </a:defRPr>
             </a:lvl1pPr>
@@ -3079,40 +3794,81 @@
           </a:p>
         </p:txBody>
       </p:sp>
+      <p:cxnSp>
+        <p:nvCxnSpPr>
+          <p:cNvPr id="10" name="Straight Connector 9"/>
+          <p:cNvCxnSpPr/>
+          <p:nvPr/>
+        </p:nvCxnSpPr>
+        <p:spPr>
+          <a:xfrm>
+            <a:off x="1193532" y="1737845"/>
+            <a:ext cx="9966960" cy="0"/>
+          </a:xfrm>
+          <a:prstGeom prst="line">
+            <a:avLst/>
+          </a:prstGeom>
+          <a:ln w="6350">
+            <a:solidFill>
+              <a:schemeClr val="tx1">
+                <a:lumMod val="50000"/>
+                <a:lumOff val="50000"/>
+              </a:schemeClr>
+            </a:solidFill>
+          </a:ln>
+        </p:spPr>
+        <p:style>
+          <a:lnRef idx="1">
+            <a:schemeClr val="accent1"/>
+          </a:lnRef>
+          <a:fillRef idx="0">
+            <a:schemeClr val="accent1"/>
+          </a:fillRef>
+          <a:effectRef idx="0">
+            <a:schemeClr val="accent1"/>
+          </a:effectRef>
+          <a:fontRef idx="minor">
+            <a:schemeClr val="tx1"/>
+          </a:fontRef>
+        </p:style>
+      </p:cxnSp>
     </p:spTree>
     <p:extLst>
       <p:ext uri="{BB962C8B-B14F-4D97-AF65-F5344CB8AC3E}">
-        <p14:creationId xmlns:p14="http://schemas.microsoft.com/office/powerpoint/2010/main" val="846044774"/>
+        <p14:creationId xmlns:p14="http://schemas.microsoft.com/office/powerpoint/2010/main" val="86024762"/>
       </p:ext>
     </p:extLst>
   </p:cSld>
   <p:clrMap bg1="lt1" tx1="dk1" bg2="lt2" tx2="dk2" accent1="accent1" accent2="accent2" accent3="accent3" accent4="accent4" accent5="accent5" accent6="accent6" hlink="hlink" folHlink="folHlink"/>
   <p:sldLayoutIdLst>
-    <p:sldLayoutId id="2147484076" r:id="rId1"/>
-    <p:sldLayoutId id="2147484077" r:id="rId2"/>
-    <p:sldLayoutId id="2147484078" r:id="rId3"/>
-    <p:sldLayoutId id="2147484079" r:id="rId4"/>
-    <p:sldLayoutId id="2147484080" r:id="rId5"/>
-    <p:sldLayoutId id="2147484081" r:id="rId6"/>
-    <p:sldLayoutId id="2147484082" r:id="rId7"/>
-    <p:sldLayoutId id="2147484083" r:id="rId8"/>
-    <p:sldLayoutId id="2147484084" r:id="rId9"/>
-    <p:sldLayoutId id="2147484085" r:id="rId10"/>
-    <p:sldLayoutId id="2147484086" r:id="rId11"/>
+    <p:sldLayoutId id="2147484280" r:id="rId1"/>
+    <p:sldLayoutId id="2147484281" r:id="rId2"/>
+    <p:sldLayoutId id="2147484282" r:id="rId3"/>
+    <p:sldLayoutId id="2147484283" r:id="rId4"/>
+    <p:sldLayoutId id="2147484284" r:id="rId5"/>
+    <p:sldLayoutId id="2147484285" r:id="rId6"/>
+    <p:sldLayoutId id="2147484286" r:id="rId7"/>
+    <p:sldLayoutId id="2147484287" r:id="rId8"/>
+    <p:sldLayoutId id="2147484288" r:id="rId9"/>
+    <p:sldLayoutId id="2147484289" r:id="rId10"/>
+    <p:sldLayoutId id="2147484290" r:id="rId11"/>
   </p:sldLayoutIdLst>
   <p:txStyles>
     <p:titleStyle>
       <a:lvl1pPr algn="l" defTabSz="914400" rtl="0" eaLnBrk="1" latinLnBrk="0" hangingPunct="1">
         <a:lnSpc>
-          <a:spcPct val="90000"/>
+          <a:spcPct val="85000"/>
         </a:lnSpc>
         <a:spcBef>
           <a:spcPct val="0"/>
         </a:spcBef>
         <a:buNone/>
-        <a:defRPr sz="4400" kern="1200">
+        <a:defRPr sz="4800" kern="1200" spc="-50" baseline="0">
           <a:solidFill>
-            <a:schemeClr val="tx1"/>
+            <a:schemeClr val="tx1">
+              <a:lumMod val="75000"/>
+              <a:lumOff val="25000"/>
+            </a:schemeClr>
           </a:solidFill>
           <a:latin typeface="+mj-lt"/>
           <a:ea typeface="+mj-ea"/>
@@ -3121,162 +3877,244 @@
       </a:lvl1pPr>
     </p:titleStyle>
     <p:bodyStyle>
-      <a:lvl1pPr marL="228600" indent="-228600" algn="l" defTabSz="914400" rtl="0" eaLnBrk="1" latinLnBrk="0" hangingPunct="1">
+      <a:lvl1pPr marL="91440" indent="-91440" algn="l" defTabSz="914400" rtl="0" eaLnBrk="1" latinLnBrk="0" hangingPunct="1">
         <a:lnSpc>
           <a:spcPct val="90000"/>
         </a:lnSpc>
         <a:spcBef>
-          <a:spcPts val="1000"/>
+          <a:spcPts val="1200"/>
         </a:spcBef>
-        <a:buFont typeface="Arial"/>
-        <a:buChar char="•"/>
-        <a:defRPr sz="2800" kern="1200">
+        <a:spcAft>
+          <a:spcPts val="200"/>
+        </a:spcAft>
+        <a:buClr>
+          <a:schemeClr val="accent1"/>
+        </a:buClr>
+        <a:buSzPct val="100000"/>
+        <a:buFont typeface="Calibri" panose="020F0502020204030204" pitchFamily="34" charset="0"/>
+        <a:buChar char=" "/>
+        <a:defRPr sz="2000" kern="1200">
           <a:solidFill>
-            <a:schemeClr val="tx1"/>
+            <a:schemeClr val="tx1">
+              <a:lumMod val="75000"/>
+              <a:lumOff val="25000"/>
+            </a:schemeClr>
           </a:solidFill>
           <a:latin typeface="+mn-lt"/>
           <a:ea typeface="+mn-ea"/>
           <a:cs typeface="+mn-cs"/>
         </a:defRPr>
       </a:lvl1pPr>
-      <a:lvl2pPr marL="685800" indent="-228600" algn="l" defTabSz="914400" rtl="0" eaLnBrk="1" latinLnBrk="0" hangingPunct="1">
+      <a:lvl2pPr marL="384048" indent="-182880" algn="l" defTabSz="914400" rtl="0" eaLnBrk="1" latinLnBrk="0" hangingPunct="1">
         <a:lnSpc>
           <a:spcPct val="90000"/>
         </a:lnSpc>
         <a:spcBef>
-          <a:spcPts val="500"/>
+          <a:spcPts val="200"/>
         </a:spcBef>
-        <a:buFont typeface="Arial"/>
-        <a:buChar char="•"/>
-        <a:defRPr sz="2400" kern="1200">
+        <a:spcAft>
+          <a:spcPts val="400"/>
+        </a:spcAft>
+        <a:buClr>
+          <a:schemeClr val="accent1"/>
+        </a:buClr>
+        <a:buFont typeface="Calibri" pitchFamily="34" charset="0"/>
+        <a:buChar char="◦"/>
+        <a:defRPr sz="1800" kern="1200">
           <a:solidFill>
-            <a:schemeClr val="tx1"/>
+            <a:schemeClr val="tx1">
+              <a:lumMod val="75000"/>
+              <a:lumOff val="25000"/>
+            </a:schemeClr>
           </a:solidFill>
           <a:latin typeface="+mn-lt"/>
           <a:ea typeface="+mn-ea"/>
           <a:cs typeface="+mn-cs"/>
         </a:defRPr>
       </a:lvl2pPr>
-      <a:lvl3pPr marL="1143000" indent="-228600" algn="l" defTabSz="914400" rtl="0" eaLnBrk="1" latinLnBrk="0" hangingPunct="1">
+      <a:lvl3pPr marL="566928" indent="-182880" algn="l" defTabSz="914400" rtl="0" eaLnBrk="1" latinLnBrk="0" hangingPunct="1">
         <a:lnSpc>
           <a:spcPct val="90000"/>
         </a:lnSpc>
         <a:spcBef>
-          <a:spcPts val="500"/>
+          <a:spcPts val="200"/>
         </a:spcBef>
-        <a:buFont typeface="Arial"/>
-        <a:buChar char="•"/>
-        <a:defRPr sz="2000" kern="1200">
+        <a:spcAft>
+          <a:spcPts val="400"/>
+        </a:spcAft>
+        <a:buClr>
+          <a:schemeClr val="accent1"/>
+        </a:buClr>
+        <a:buFont typeface="Calibri" pitchFamily="34" charset="0"/>
+        <a:buChar char="◦"/>
+        <a:defRPr sz="1400" kern="1200">
           <a:solidFill>
-            <a:schemeClr val="tx1"/>
+            <a:schemeClr val="tx1">
+              <a:lumMod val="75000"/>
+              <a:lumOff val="25000"/>
+            </a:schemeClr>
           </a:solidFill>
           <a:latin typeface="+mn-lt"/>
           <a:ea typeface="+mn-ea"/>
           <a:cs typeface="+mn-cs"/>
         </a:defRPr>
       </a:lvl3pPr>
-      <a:lvl4pPr marL="1600200" indent="-228600" algn="l" defTabSz="914400" rtl="0" eaLnBrk="1" latinLnBrk="0" hangingPunct="1">
+      <a:lvl4pPr marL="749808" indent="-182880" algn="l" defTabSz="914400" rtl="0" eaLnBrk="1" latinLnBrk="0" hangingPunct="1">
         <a:lnSpc>
           <a:spcPct val="90000"/>
         </a:lnSpc>
         <a:spcBef>
-          <a:spcPts val="500"/>
+          <a:spcPts val="200"/>
         </a:spcBef>
-        <a:buFont typeface="Arial"/>
-        <a:buChar char="•"/>
-        <a:defRPr sz="1800" kern="1200">
+        <a:spcAft>
+          <a:spcPts val="400"/>
+        </a:spcAft>
+        <a:buClr>
+          <a:schemeClr val="accent1"/>
+        </a:buClr>
+        <a:buFont typeface="Calibri" pitchFamily="34" charset="0"/>
+        <a:buChar char="◦"/>
+        <a:defRPr sz="1400" kern="1200">
           <a:solidFill>
-            <a:schemeClr val="tx1"/>
+            <a:schemeClr val="tx1">
+              <a:lumMod val="75000"/>
+              <a:lumOff val="25000"/>
+            </a:schemeClr>
           </a:solidFill>
           <a:latin typeface="+mn-lt"/>
           <a:ea typeface="+mn-ea"/>
           <a:cs typeface="+mn-cs"/>
         </a:defRPr>
       </a:lvl4pPr>
-      <a:lvl5pPr marL="2057400" indent="-228600" algn="l" defTabSz="914400" rtl="0" eaLnBrk="1" latinLnBrk="0" hangingPunct="1">
+      <a:lvl5pPr marL="932688" indent="-182880" algn="l" defTabSz="914400" rtl="0" eaLnBrk="1" latinLnBrk="0" hangingPunct="1">
         <a:lnSpc>
           <a:spcPct val="90000"/>
         </a:lnSpc>
         <a:spcBef>
-          <a:spcPts val="500"/>
+          <a:spcPts val="200"/>
         </a:spcBef>
-        <a:buFont typeface="Arial"/>
-        <a:buChar char="•"/>
-        <a:defRPr sz="1800" kern="1200">
+        <a:spcAft>
+          <a:spcPts val="400"/>
+        </a:spcAft>
+        <a:buClr>
+          <a:schemeClr val="accent1"/>
+        </a:buClr>
+        <a:buFont typeface="Calibri" pitchFamily="34" charset="0"/>
+        <a:buChar char="◦"/>
+        <a:defRPr sz="1400" kern="1200">
           <a:solidFill>
-            <a:schemeClr val="tx1"/>
+            <a:schemeClr val="tx1">
+              <a:lumMod val="75000"/>
+              <a:lumOff val="25000"/>
+            </a:schemeClr>
           </a:solidFill>
           <a:latin typeface="+mn-lt"/>
           <a:ea typeface="+mn-ea"/>
           <a:cs typeface="+mn-cs"/>
         </a:defRPr>
       </a:lvl5pPr>
-      <a:lvl6pPr marL="2514600" indent="-228600" algn="l" defTabSz="914400" rtl="0" eaLnBrk="1" latinLnBrk="0" hangingPunct="1">
+      <a:lvl6pPr marL="1100000" indent="-228600" algn="l" defTabSz="914400" rtl="0" eaLnBrk="1" latinLnBrk="0" hangingPunct="1">
         <a:lnSpc>
           <a:spcPct val="90000"/>
         </a:lnSpc>
         <a:spcBef>
-          <a:spcPts val="500"/>
+          <a:spcPts val="200"/>
         </a:spcBef>
-        <a:buFont typeface="Arial"/>
-        <a:buChar char="•"/>
-        <a:defRPr sz="1800" kern="1200">
+        <a:spcAft>
+          <a:spcPts val="400"/>
+        </a:spcAft>
+        <a:buClr>
+          <a:schemeClr val="accent1"/>
+        </a:buClr>
+        <a:buFont typeface="Calibri" pitchFamily="34" charset="0"/>
+        <a:buChar char="◦"/>
+        <a:defRPr sz="1400" kern="1200">
           <a:solidFill>
-            <a:schemeClr val="tx1"/>
+            <a:schemeClr val="tx1">
+              <a:lumMod val="75000"/>
+              <a:lumOff val="25000"/>
+            </a:schemeClr>
           </a:solidFill>
           <a:latin typeface="+mn-lt"/>
           <a:ea typeface="+mn-ea"/>
           <a:cs typeface="+mn-cs"/>
         </a:defRPr>
       </a:lvl6pPr>
-      <a:lvl7pPr marL="2971800" indent="-228600" algn="l" defTabSz="914400" rtl="0" eaLnBrk="1" latinLnBrk="0" hangingPunct="1">
+      <a:lvl7pPr marL="1300000" indent="-228600" algn="l" defTabSz="914400" rtl="0" eaLnBrk="1" latinLnBrk="0" hangingPunct="1">
         <a:lnSpc>
           <a:spcPct val="90000"/>
         </a:lnSpc>
         <a:spcBef>
-          <a:spcPts val="500"/>
+          <a:spcPts val="200"/>
         </a:spcBef>
-        <a:buFont typeface="Arial"/>
-        <a:buChar char="•"/>
-        <a:defRPr sz="1800" kern="1200">
+        <a:spcAft>
+          <a:spcPts val="400"/>
+        </a:spcAft>
+        <a:buClr>
+          <a:schemeClr val="accent1"/>
+        </a:buClr>
+        <a:buFont typeface="Calibri" pitchFamily="34" charset="0"/>
+        <a:buChar char="◦"/>
+        <a:defRPr sz="1400" kern="1200">
           <a:solidFill>
-            <a:schemeClr val="tx1"/>
+            <a:schemeClr val="tx1">
+              <a:lumMod val="75000"/>
+              <a:lumOff val="25000"/>
+            </a:schemeClr>
           </a:solidFill>
           <a:latin typeface="+mn-lt"/>
           <a:ea typeface="+mn-ea"/>
           <a:cs typeface="+mn-cs"/>
         </a:defRPr>
       </a:lvl7pPr>
-      <a:lvl8pPr marL="3429000" indent="-228600" algn="l" defTabSz="914400" rtl="0" eaLnBrk="1" latinLnBrk="0" hangingPunct="1">
+      <a:lvl8pPr marL="1500000" indent="-228600" algn="l" defTabSz="914400" rtl="0" eaLnBrk="1" latinLnBrk="0" hangingPunct="1">
         <a:lnSpc>
           <a:spcPct val="90000"/>
         </a:lnSpc>
         <a:spcBef>
-          <a:spcPts val="500"/>
+          <a:spcPts val="200"/>
         </a:spcBef>
-        <a:buFont typeface="Arial"/>
-        <a:buChar char="•"/>
-        <a:defRPr sz="1800" kern="1200">
+        <a:spcAft>
+          <a:spcPts val="400"/>
+        </a:spcAft>
+        <a:buClr>
+          <a:schemeClr val="accent1"/>
+        </a:buClr>
+        <a:buFont typeface="Calibri" pitchFamily="34" charset="0"/>
+        <a:buChar char="◦"/>
+        <a:defRPr sz="1400" kern="1200">
           <a:solidFill>
-            <a:schemeClr val="tx1"/>
+            <a:schemeClr val="tx1">
+              <a:lumMod val="75000"/>
+              <a:lumOff val="25000"/>
+            </a:schemeClr>
           </a:solidFill>
           <a:latin typeface="+mn-lt"/>
           <a:ea typeface="+mn-ea"/>
           <a:cs typeface="+mn-cs"/>
         </a:defRPr>
       </a:lvl8pPr>
-      <a:lvl9pPr marL="3886200" indent="-228600" algn="l" defTabSz="914400" rtl="0" eaLnBrk="1" latinLnBrk="0" hangingPunct="1">
+      <a:lvl9pPr marL="1700000" indent="-228600" algn="l" defTabSz="914400" rtl="0" eaLnBrk="1" latinLnBrk="0" hangingPunct="1">
         <a:lnSpc>
           <a:spcPct val="90000"/>
         </a:lnSpc>
         <a:spcBef>
-          <a:spcPts val="500"/>
+          <a:spcPts val="200"/>
         </a:spcBef>
-        <a:buFont typeface="Arial"/>
-        <a:buChar char="•"/>
-        <a:defRPr sz="1800" kern="1200">
+        <a:spcAft>
+          <a:spcPts val="400"/>
+        </a:spcAft>
+        <a:buClr>
+          <a:schemeClr val="accent1"/>
+        </a:buClr>
+        <a:buFont typeface="Calibri" pitchFamily="34" charset="0"/>
+        <a:buChar char="◦"/>
+        <a:defRPr sz="1400" kern="1200">
           <a:solidFill>
-            <a:schemeClr val="tx1"/>
+            <a:schemeClr val="tx1">
+              <a:lumMod val="75000"/>
+              <a:lumOff val="25000"/>
+            </a:schemeClr>
           </a:solidFill>
           <a:latin typeface="+mn-lt"/>
           <a:ea typeface="+mn-ea"/>
@@ -3470,6 +4308,13 @@
   <p:clrMapOvr>
     <a:masterClrMapping/>
   </p:clrMapOvr>
+  <p:timing>
+    <p:tnLst>
+      <p:par>
+        <p:cTn id="1" dur="indefinite" restart="never" nodeType="tmRoot"/>
+      </p:par>
+    </p:tnLst>
+  </p:timing>
 </p:sld>
 </file>
 
@@ -3547,8 +4392,25 @@
           <a:lstStyle/>
           <a:p>
             <a:r>
+              <a:rPr lang="en-US" dirty="0" smtClean="0"/>
+              <a:t>Overview of service</a:t>
+            </a:r>
+          </a:p>
+          <a:p>
+            <a:r>
+              <a:rPr lang="en-US" dirty="0" smtClean="0"/>
+              <a:t>Walkthrough marathon configuration</a:t>
+            </a:r>
+            <a:endParaRPr lang="en-US" dirty="0" smtClean="0"/>
+          </a:p>
+          <a:p>
+            <a:r>
+              <a:rPr lang="en-US" dirty="0" smtClean="0"/>
+              <a:t>Deployment </a:t>
+            </a:r>
+            <a:r>
               <a:rPr lang="en-US" dirty="0"/>
-              <a:t>Deployment options</a:t>
+              <a:t>options</a:t>
             </a:r>
           </a:p>
           <a:p>
@@ -3657,7 +4519,6 @@
               <a:rPr lang="en-US" dirty="0" smtClean="0"/>
               <a:t>Can fill up route table for chatty services</a:t>
             </a:r>
-            <a:endParaRPr lang="en-US" dirty="0" smtClean="0"/>
           </a:p>
         </p:txBody>
       </p:sp>
@@ -3729,6 +4590,88 @@
           <a:bodyPr/>
           <a:lstStyle/>
           <a:p>
+            <a:r>
+              <a:rPr lang="en-US" dirty="0" smtClean="0"/>
+              <a:t>Overview of components</a:t>
+            </a:r>
+          </a:p>
+          <a:p>
+            <a:pPr lvl="1"/>
+            <a:r>
+              <a:rPr lang="en-US" dirty="0" smtClean="0"/>
+              <a:t>Scheduler</a:t>
+            </a:r>
+          </a:p>
+          <a:p>
+            <a:pPr lvl="1"/>
+            <a:r>
+              <a:rPr lang="en-US" dirty="0" smtClean="0"/>
+              <a:t>Web Service</a:t>
+            </a:r>
+          </a:p>
+          <a:p>
+            <a:pPr lvl="1"/>
+            <a:r>
+              <a:rPr lang="en-US" dirty="0" smtClean="0"/>
+              <a:t>UI</a:t>
+            </a:r>
+          </a:p>
+          <a:p>
+            <a:pPr lvl="1"/>
+            <a:r>
+              <a:rPr lang="en-US" dirty="0" smtClean="0"/>
+              <a:t>Persistence (Postgres)</a:t>
+            </a:r>
+          </a:p>
+          <a:p>
+            <a:pPr lvl="1"/>
+            <a:r>
+              <a:rPr lang="en-US" dirty="0" smtClean="0"/>
+              <a:t>Log Collector (</a:t>
+            </a:r>
+            <a:r>
+              <a:rPr lang="en-US" dirty="0" err="1" smtClean="0"/>
+              <a:t>Logstash</a:t>
+            </a:r>
+            <a:r>
+              <a:rPr lang="en-US" dirty="0" smtClean="0"/>
+              <a:t>)</a:t>
+            </a:r>
+          </a:p>
+          <a:p>
+            <a:pPr lvl="1"/>
+            <a:r>
+              <a:rPr lang="en-US" dirty="0" smtClean="0"/>
+              <a:t>Log Storage (</a:t>
+            </a:r>
+            <a:r>
+              <a:rPr lang="en-US" dirty="0" err="1" smtClean="0"/>
+              <a:t>Elasticsearch</a:t>
+            </a:r>
+            <a:r>
+              <a:rPr lang="en-US" dirty="0" smtClean="0"/>
+              <a:t>)</a:t>
+            </a:r>
+          </a:p>
+          <a:p>
+            <a:r>
+              <a:rPr lang="en-US" dirty="0" smtClean="0"/>
+              <a:t>Walkthrough of deployment process</a:t>
+            </a:r>
+          </a:p>
+          <a:p>
+            <a:r>
+              <a:rPr lang="en-US" dirty="0" smtClean="0"/>
+              <a:t>Demonstrate public exposure via Marathon-</a:t>
+            </a:r>
+            <a:r>
+              <a:rPr lang="en-US" dirty="0" err="1" smtClean="0"/>
+              <a:t>lb</a:t>
+            </a:r>
+            <a:endParaRPr lang="en-US" dirty="0" smtClean="0"/>
+          </a:p>
+          <a:p>
+            <a:pPr lvl="1"/>
             <a:endParaRPr lang="en-US" dirty="0"/>
           </a:p>
         </p:txBody>
@@ -3935,6 +4878,127 @@
           <a:p>
             <a:r>
               <a:rPr lang="en-US" dirty="0" smtClean="0"/>
+              <a:t>Packaging Guidelines</a:t>
+            </a:r>
+            <a:endParaRPr lang="en-US" dirty="0"/>
+          </a:p>
+        </p:txBody>
+      </p:sp>
+      <p:sp>
+        <p:nvSpPr>
+          <p:cNvPr id="3" name="Content Placeholder 2"/>
+          <p:cNvSpPr>
+            <a:spLocks noGrp="1"/>
+          </p:cNvSpPr>
+          <p:nvPr>
+            <p:ph idx="1"/>
+          </p:nvPr>
+        </p:nvSpPr>
+        <p:spPr/>
+        <p:txBody>
+          <a:bodyPr>
+            <a:normAutofit/>
+          </a:bodyPr>
+          <a:lstStyle/>
+          <a:p>
+            <a:r>
+              <a:rPr lang="en-US" dirty="0" smtClean="0"/>
+              <a:t>Determine the right trade-off for multi-component systems</a:t>
+            </a:r>
+          </a:p>
+          <a:p>
+            <a:pPr lvl="1"/>
+            <a:r>
+              <a:rPr lang="en-US" dirty="0" smtClean="0"/>
+              <a:t>Bootstrap entire system, increased deployment fragility</a:t>
+            </a:r>
+          </a:p>
+          <a:p>
+            <a:pPr lvl="1"/>
+            <a:r>
+              <a:rPr lang="en-US" dirty="0" smtClean="0"/>
+              <a:t>More involved deployment instructions, reduced deployment fragility</a:t>
+            </a:r>
+            <a:endParaRPr lang="en-US" dirty="0" smtClean="0"/>
+          </a:p>
+          <a:p>
+            <a:r>
+              <a:rPr lang="en-US" dirty="0" smtClean="0"/>
+              <a:t>Support multiple service access mechanisms</a:t>
+            </a:r>
+          </a:p>
+          <a:p>
+            <a:pPr lvl="1"/>
+            <a:r>
+              <a:rPr lang="en-US" dirty="0" smtClean="0"/>
+              <a:t>Marathon-</a:t>
+            </a:r>
+            <a:r>
+              <a:rPr lang="en-US" dirty="0" err="1" smtClean="0"/>
+              <a:t>lb</a:t>
+            </a:r>
+            <a:r>
+              <a:rPr lang="en-US" dirty="0" smtClean="0"/>
+              <a:t> internal/external</a:t>
+            </a:r>
+          </a:p>
+          <a:p>
+            <a:pPr lvl="1"/>
+            <a:r>
+              <a:rPr lang="en-US" dirty="0" smtClean="0"/>
+              <a:t>Minuteman Virtual IPs</a:t>
+            </a:r>
+            <a:endParaRPr lang="en-US" dirty="0"/>
+          </a:p>
+        </p:txBody>
+      </p:sp>
+    </p:spTree>
+    <p:extLst>
+      <p:ext uri="{BB962C8B-B14F-4D97-AF65-F5344CB8AC3E}">
+        <p14:creationId xmlns:p14="http://schemas.microsoft.com/office/powerpoint/2010/main" val="1107345051"/>
+      </p:ext>
+    </p:extLst>
+  </p:cSld>
+  <p:clrMapOvr>
+    <a:masterClrMapping/>
+  </p:clrMapOvr>
+</p:sld>
+</file>
+
+<file path=ppt/slides/slide14.xml><?xml version="1.0" encoding="utf-8"?>
+<p:sld xmlns:a="http://schemas.openxmlformats.org/drawingml/2006/main" xmlns:r="http://schemas.openxmlformats.org/officeDocument/2006/relationships" xmlns:p="http://schemas.openxmlformats.org/presentationml/2006/main">
+  <p:cSld>
+    <p:spTree>
+      <p:nvGrpSpPr>
+        <p:cNvPr id="1" name=""/>
+        <p:cNvGrpSpPr/>
+        <p:nvPr/>
+      </p:nvGrpSpPr>
+      <p:grpSpPr>
+        <a:xfrm>
+          <a:off x="0" y="0"/>
+          <a:ext cx="0" cy="0"/>
+          <a:chOff x="0" y="0"/>
+          <a:chExt cx="0" cy="0"/>
+        </a:xfrm>
+      </p:grpSpPr>
+      <p:sp>
+        <p:nvSpPr>
+          <p:cNvPr id="2" name="Title 1"/>
+          <p:cNvSpPr>
+            <a:spLocks noGrp="1"/>
+          </p:cNvSpPr>
+          <p:nvPr>
+            <p:ph type="title"/>
+          </p:nvPr>
+        </p:nvSpPr>
+        <p:spPr/>
+        <p:txBody>
+          <a:bodyPr/>
+          <a:lstStyle/>
+          <a:p>
+            <a:r>
+              <a:rPr lang="en-US" dirty="0" smtClean="0"/>
               <a:t>Further Reading</a:t>
             </a:r>
             <a:endParaRPr lang="en-US" dirty="0"/>
@@ -4096,7 +5160,7 @@
 </p:sld>
 </file>
 
-<file path=ppt/slides/slide14.xml><?xml version="1.0" encoding="utf-8"?>
+<file path=ppt/slides/slide15.xml><?xml version="1.0" encoding="utf-8"?>
 <p:sld xmlns:a="http://schemas.openxmlformats.org/drawingml/2006/main" xmlns:r="http://schemas.openxmlformats.org/officeDocument/2006/relationships" xmlns:p="http://schemas.openxmlformats.org/presentationml/2006/main">
   <p:cSld>
     <p:spTree>
@@ -4331,6 +5395,13 @@
   <p:clrMapOvr>
     <a:masterClrMapping/>
   </p:clrMapOvr>
+  <p:timing>
+    <p:tnLst>
+      <p:par>
+        <p:cTn id="1" dur="indefinite" restart="never" nodeType="tmRoot"/>
+      </p:par>
+    </p:tnLst>
+  </p:timing>
 </p:sld>
 </file>
 
@@ -4443,6 +5514,13 @@
   <p:clrMapOvr>
     <a:masterClrMapping/>
   </p:clrMapOvr>
+  <p:timing>
+    <p:tnLst>
+      <p:par>
+        <p:cTn id="1" dur="indefinite" restart="never" nodeType="tmRoot"/>
+      </p:par>
+    </p:tnLst>
+  </p:timing>
 </p:sld>
 </file>
 
@@ -5073,7 +6151,11 @@
           <a:p>
             <a:pPr algn="ctr"/>
             <a:r>
-              <a:rPr lang="en-US" dirty="0"/>
+              <a:rPr lang="en-US" dirty="0">
+                <a:solidFill>
+                  <a:schemeClr val="tx1"/>
+                </a:solidFill>
+              </a:rPr>
               <a:t>Marathon</a:t>
             </a:r>
           </a:p>
@@ -5119,7 +6201,11 @@
           <a:p>
             <a:pPr algn="ctr"/>
             <a:r>
-              <a:rPr lang="en-US" dirty="0"/>
+              <a:rPr lang="en-US" dirty="0">
+                <a:solidFill>
+                  <a:schemeClr val="tx1"/>
+                </a:solidFill>
+              </a:rPr>
               <a:t>Admin Router</a:t>
             </a:r>
           </a:p>
@@ -5216,10 +6302,18 @@
           <a:p>
             <a:pPr algn="ctr"/>
             <a:r>
-              <a:rPr lang="en-US" dirty="0" smtClean="0"/>
+              <a:rPr lang="en-US" dirty="0" smtClean="0">
+                <a:solidFill>
+                  <a:schemeClr val="tx1"/>
+                </a:solidFill>
+              </a:rPr>
               <a:t>Your Service</a:t>
             </a:r>
-            <a:endParaRPr lang="en-US" dirty="0"/>
+            <a:endParaRPr lang="en-US" dirty="0">
+              <a:solidFill>
+                <a:schemeClr val="tx1"/>
+              </a:solidFill>
+            </a:endParaRPr>
           </a:p>
         </p:txBody>
       </p:sp>
@@ -5567,7 +6661,6 @@
               <a:rPr lang="en-US" dirty="0" smtClean="0"/>
               <a:t>website</a:t>
             </a:r>
-            <a:endParaRPr lang="en-US" dirty="0" smtClean="0"/>
           </a:p>
           <a:p>
             <a:r>
@@ -5706,8 +6799,17 @@
           <a:p>
             <a:r>
               <a:rPr lang="en-US" dirty="0" smtClean="0"/>
-              <a:t>Add health check, demonstrate port conflict</a:t>
-            </a:r>
+              <a:t>Add health check, </a:t>
+            </a:r>
+            <a:r>
+              <a:rPr lang="en-US" smtClean="0"/>
+              <a:t>demonstrate </a:t>
+            </a:r>
+            <a:r>
+              <a:rPr lang="en-US" smtClean="0"/>
+              <a:t>waiting state</a:t>
+            </a:r>
+            <a:endParaRPr lang="en-US" dirty="0" smtClean="0"/>
           </a:p>
           <a:p>
             <a:endParaRPr lang="en-US" dirty="0"/>
@@ -5728,54 +6830,54 @@
 </file>
 
 <file path=ppt/theme/theme1.xml><?xml version="1.0" encoding="utf-8"?>
-<a:theme xmlns:a="http://schemas.openxmlformats.org/drawingml/2006/main" name="Office Theme">
+<a:theme xmlns:a="http://schemas.openxmlformats.org/drawingml/2006/main" name="Retrospect">
   <a:themeElements>
-    <a:clrScheme name="Office">
+    <a:clrScheme name="Retrospect">
       <a:dk1>
-        <a:sysClr val="windowText" lastClr="000000"/>
+        <a:srgbClr val="000000"/>
       </a:dk1>
       <a:lt1>
         <a:sysClr val="window" lastClr="FFFFFF"/>
       </a:lt1>
       <a:dk2>
-        <a:srgbClr val="44546A"/>
+        <a:srgbClr val="637052"/>
       </a:dk2>
       <a:lt2>
-        <a:srgbClr val="E7E6E6"/>
+        <a:srgbClr val="CCDDEA"/>
       </a:lt2>
       <a:accent1>
-        <a:srgbClr val="4472C4"/>
+        <a:srgbClr val="E48312"/>
       </a:accent1>
       <a:accent2>
-        <a:srgbClr val="ED7D31"/>
+        <a:srgbClr val="BD582C"/>
       </a:accent2>
       <a:accent3>
-        <a:srgbClr val="A5A5A5"/>
+        <a:srgbClr val="865640"/>
       </a:accent3>
       <a:accent4>
-        <a:srgbClr val="FFC000"/>
+        <a:srgbClr val="9B8357"/>
       </a:accent4>
       <a:accent5>
-        <a:srgbClr val="5B9BD5"/>
+        <a:srgbClr val="C2BC80"/>
       </a:accent5>
       <a:accent6>
-        <a:srgbClr val="70AD47"/>
+        <a:srgbClr val="94A088"/>
       </a:accent6>
       <a:hlink>
-        <a:srgbClr val="0563C1"/>
+        <a:srgbClr val="2998E3"/>
       </a:hlink>
       <a:folHlink>
-        <a:srgbClr val="954F72"/>
+        <a:srgbClr val="8C8C8C"/>
       </a:folHlink>
     </a:clrScheme>
-    <a:fontScheme name="Office">
+    <a:fontScheme name="Retrospect">
       <a:majorFont>
         <a:latin typeface="Calibri Light" panose="020F0302020204030204"/>
         <a:ea typeface=""/>
         <a:cs typeface=""/>
-        <a:font script="Jpan" typeface="Yu Gothic Light"/>
+        <a:font script="Jpan" typeface="ＭＳ Ｐゴシック"/>
         <a:font script="Hang" typeface="맑은 고딕"/>
-        <a:font script="Hans" typeface="DengXian Light"/>
+        <a:font script="Hans" typeface="宋体"/>
         <a:font script="Hant" typeface="新細明體"/>
         <a:font script="Arab" typeface="Times New Roman"/>
         <a:font script="Hebr" typeface="Times New Roman"/>
@@ -5808,9 +6910,9 @@
         <a:latin typeface="Calibri" panose="020F0502020204030204"/>
         <a:ea typeface=""/>
         <a:cs typeface=""/>
-        <a:font script="Jpan" typeface="Yu Gothic"/>
+        <a:font script="Jpan" typeface="ＭＳ Ｐゴシック"/>
         <a:font script="Hang" typeface="맑은 고딕"/>
-        <a:font script="Hans" typeface="DengXian"/>
+        <a:font script="Hans" typeface="宋体"/>
         <a:font script="Hant" typeface="新細明體"/>
         <a:font script="Arab" typeface="Arial"/>
         <a:font script="Hebr" typeface="Arial"/>
@@ -5840,7 +6942,7 @@
         <a:font script="Geor" typeface="Sylfaen"/>
       </a:minorFont>
     </a:fontScheme>
-    <a:fmtScheme name="Office">
+    <a:fmtScheme name="Retrospect">
       <a:fillStyleLst>
         <a:solidFill>
           <a:schemeClr val="phClr"/>
@@ -5849,76 +6951,81 @@
           <a:gsLst>
             <a:gs pos="0">
               <a:schemeClr val="phClr">
-                <a:lumMod val="110000"/>
-                <a:satMod val="105000"/>
-                <a:tint val="67000"/>
+                <a:tint val="65000"/>
+                <a:shade val="92000"/>
+                <a:satMod val="130000"/>
               </a:schemeClr>
             </a:gs>
-            <a:gs pos="50000">
+            <a:gs pos="45000">
               <a:schemeClr val="phClr">
-                <a:lumMod val="105000"/>
-                <a:satMod val="103000"/>
-                <a:tint val="73000"/>
+                <a:tint val="60000"/>
+                <a:shade val="99000"/>
+                <a:satMod val="120000"/>
               </a:schemeClr>
             </a:gs>
             <a:gs pos="100000">
               <a:schemeClr val="phClr">
-                <a:lumMod val="105000"/>
-                <a:satMod val="109000"/>
-                <a:tint val="81000"/>
+                <a:tint val="55000"/>
+                <a:satMod val="140000"/>
               </a:schemeClr>
             </a:gs>
           </a:gsLst>
-          <a:lin ang="5400000" scaled="0"/>
+          <a:path path="circle">
+            <a:fillToRect l="100000" t="100000" r="100000" b="100000"/>
+          </a:path>
         </a:gradFill>
         <a:gradFill rotWithShape="1">
           <a:gsLst>
             <a:gs pos="0">
               <a:schemeClr val="phClr">
-                <a:satMod val="103000"/>
-                <a:lumMod val="102000"/>
-                <a:tint val="94000"/>
+                <a:shade val="85000"/>
+                <a:satMod val="130000"/>
               </a:schemeClr>
             </a:gs>
-            <a:gs pos="50000">
+            <a:gs pos="34000">
               <a:schemeClr val="phClr">
-                <a:satMod val="110000"/>
-                <a:lumMod val="100000"/>
-                <a:shade val="100000"/>
+                <a:shade val="87000"/>
+                <a:satMod val="125000"/>
+              </a:schemeClr>
+            </a:gs>
+            <a:gs pos="70000">
+              <a:schemeClr val="phClr">
+                <a:tint val="100000"/>
+                <a:shade val="90000"/>
+                <a:satMod val="130000"/>
               </a:schemeClr>
             </a:gs>
             <a:gs pos="100000">
               <a:schemeClr val="phClr">
-                <a:lumMod val="99000"/>
-                <a:satMod val="120000"/>
-                <a:shade val="78000"/>
+                <a:tint val="100000"/>
+                <a:shade val="100000"/>
+                <a:satMod val="110000"/>
               </a:schemeClr>
             </a:gs>
           </a:gsLst>
-          <a:lin ang="5400000" scaled="0"/>
+          <a:path path="circle">
+            <a:fillToRect l="100000" t="100000" r="100000" b="100000"/>
+          </a:path>
         </a:gradFill>
       </a:fillStyleLst>
       <a:lnStyleLst>
-        <a:ln w="6350" cap="flat" cmpd="sng" algn="ctr">
-          <a:solidFill>
-            <a:schemeClr val="phClr"/>
-          </a:solidFill>
-          <a:prstDash val="solid"/>
-          <a:miter lim="800000"/>
-        </a:ln>
         <a:ln w="12700" cap="flat" cmpd="sng" algn="ctr">
           <a:solidFill>
             <a:schemeClr val="phClr"/>
           </a:solidFill>
           <a:prstDash val="solid"/>
-          <a:miter lim="800000"/>
         </a:ln>
-        <a:ln w="19050" cap="flat" cmpd="sng" algn="ctr">
+        <a:ln w="15875" cap="flat" cmpd="sng" algn="ctr">
           <a:solidFill>
             <a:schemeClr val="phClr"/>
           </a:solidFill>
           <a:prstDash val="solid"/>
-          <a:miter lim="800000"/>
+        </a:ln>
+        <a:ln w="25400" cap="flat" cmpd="sng" algn="ctr">
+          <a:solidFill>
+            <a:schemeClr val="phClr"/>
+          </a:solidFill>
+          <a:prstDash val="solid"/>
         </a:ln>
       </a:lnStyleLst>
       <a:effectStyleLst>
@@ -5926,16 +7033,33 @@
           <a:effectLst/>
         </a:effectStyle>
         <a:effectStyle>
-          <a:effectLst/>
+          <a:effectLst>
+            <a:outerShdw blurRad="38100" dist="25400" dir="2700000" algn="br" rotWithShape="0">
+              <a:srgbClr val="000000">
+                <a:alpha val="60000"/>
+              </a:srgbClr>
+            </a:outerShdw>
+          </a:effectLst>
         </a:effectStyle>
         <a:effectStyle>
           <a:effectLst>
-            <a:outerShdw blurRad="57150" dist="19050" dir="5400000" algn="ctr" rotWithShape="0">
+            <a:outerShdw blurRad="44450" dist="25400" dir="2700000" algn="br" rotWithShape="0">
               <a:srgbClr val="000000">
-                <a:alpha val="63000"/>
+                <a:alpha val="60000"/>
               </a:srgbClr>
             </a:outerShdw>
           </a:effectLst>
+          <a:scene3d>
+            <a:camera prst="orthographicFront">
+              <a:rot lat="0" lon="0" rev="0"/>
+            </a:camera>
+            <a:lightRig rig="threePt" dir="t">
+              <a:rot lat="0" lon="0" rev="19800000"/>
+            </a:lightRig>
+          </a:scene3d>
+          <a:sp3d prstMaterial="flat">
+            <a:bevelT w="25400" h="31750"/>
+          </a:sp3d>
         </a:effectStyle>
       </a:effectStyleLst>
       <a:bgFillStyleLst>
@@ -5944,36 +7068,36 @@
         </a:solidFill>
         <a:solidFill>
           <a:schemeClr val="phClr">
-            <a:tint val="95000"/>
-            <a:satMod val="170000"/>
+            <a:tint val="90000"/>
+            <a:shade val="97000"/>
+            <a:satMod val="130000"/>
           </a:schemeClr>
         </a:solidFill>
         <a:gradFill rotWithShape="1">
           <a:gsLst>
             <a:gs pos="0">
               <a:schemeClr val="phClr">
-                <a:tint val="93000"/>
-                <a:satMod val="150000"/>
-                <a:shade val="98000"/>
-                <a:lumMod val="102000"/>
+                <a:tint val="96000"/>
+                <a:shade val="99000"/>
+                <a:satMod val="140000"/>
               </a:schemeClr>
             </a:gs>
-            <a:gs pos="50000">
+            <a:gs pos="65000">
               <a:schemeClr val="phClr">
-                <a:tint val="98000"/>
+                <a:tint val="100000"/>
+                <a:shade val="80000"/>
                 <a:satMod val="130000"/>
-                <a:shade val="90000"/>
-                <a:lumMod val="103000"/>
               </a:schemeClr>
             </a:gs>
             <a:gs pos="100000">
               <a:schemeClr val="phClr">
-                <a:shade val="63000"/>
+                <a:tint val="100000"/>
+                <a:shade val="48000"/>
                 <a:satMod val="120000"/>
               </a:schemeClr>
             </a:gs>
           </a:gsLst>
-          <a:lin ang="5400000" scaled="0"/>
+          <a:lin ang="16200000" scaled="0"/>
         </a:gradFill>
       </a:bgFillStyleLst>
     </a:fmtScheme>
@@ -5982,7 +7106,7 @@
   <a:extraClrSchemeLst/>
   <a:extLst>
     <a:ext uri="{05A4C25C-085E-4340-85A3-A5531E510DB2}">
-      <thm15:themeFamily xmlns:thm15="http://schemas.microsoft.com/office/thememl/2012/main" name="Office Theme" id="{62F939B6-93AF-4DB8-9C6B-D6C7DFDC589F}" vid="{4A3C46E8-61CC-4603-A589-7422A47A8E4A}"/>
+      <thm15:themeFamily xmlns:thm15="http://schemas.microsoft.com/office/thememl/2012/main" name="Retrospect" id="{5F128B03-DCCA-4EEB-AB3B-CF2899314A46}" vid="{3F1AAB62-24C6-49D2-8E01-B56FAC9A3DCD}"/>
     </a:ext>
   </a:extLst>
 </a:theme>

</xml_diff>